<commit_message>
Merged PR 176: Add Continuous Delivery Module and minor updates
This PR is for the addition of a Continuous Delivery module and minor updates to labs and deck following a run through.
</commit_message>
<xml_diff>
--- a/PPTs/00_Workshop_Introduction.pptx
+++ b/PPTs/00_Workshop_Introduction.pptx
@@ -5,10 +5,10 @@
     <p:sldMasterId id="2147484229" r:id="rId4"/>
   </p:sldMasterIdLst>
   <p:notesMasterIdLst>
-    <p:notesMasterId r:id="rId16"/>
+    <p:notesMasterId r:id="rId18"/>
   </p:notesMasterIdLst>
   <p:handoutMasterIdLst>
-    <p:handoutMasterId r:id="rId17"/>
+    <p:handoutMasterId r:id="rId19"/>
   </p:handoutMasterIdLst>
   <p:sldIdLst>
     <p:sldId id="2076138454" r:id="rId5"/>
@@ -16,12 +16,14 @@
     <p:sldId id="1892" r:id="rId7"/>
     <p:sldId id="2076138456" r:id="rId8"/>
     <p:sldId id="2076138457" r:id="rId9"/>
-    <p:sldId id="2076138458" r:id="rId10"/>
-    <p:sldId id="2076138299" r:id="rId11"/>
-    <p:sldId id="277" r:id="rId12"/>
-    <p:sldId id="1897" r:id="rId13"/>
-    <p:sldId id="1893" r:id="rId14"/>
-    <p:sldId id="1532" r:id="rId15"/>
+    <p:sldId id="2076138465" r:id="rId10"/>
+    <p:sldId id="2076138458" r:id="rId11"/>
+    <p:sldId id="2076138299" r:id="rId12"/>
+    <p:sldId id="277" r:id="rId13"/>
+    <p:sldId id="1897" r:id="rId14"/>
+    <p:sldId id="2076138469" r:id="rId15"/>
+    <p:sldId id="1893" r:id="rId16"/>
+    <p:sldId id="1532" r:id="rId17"/>
   </p:sldIdLst>
   <p:sldSz cx="12192000" cy="6858000"/>
   <p:notesSz cx="6858000" cy="9144000"/>
@@ -130,10 +132,12 @@
             <p14:sldId id="1892"/>
             <p14:sldId id="2076138456"/>
             <p14:sldId id="2076138457"/>
+            <p14:sldId id="2076138465"/>
             <p14:sldId id="2076138458"/>
             <p14:sldId id="2076138299"/>
             <p14:sldId id="277"/>
             <p14:sldId id="1897"/>
+            <p14:sldId id="2076138469"/>
             <p14:sldId id="1893"/>
             <p14:sldId id="1532"/>
           </p14:sldIdLst>
@@ -199,45 +203,6 @@
 
 <file path=ppt/changesInfos/changesInfo1.xml><?xml version="1.0" encoding="utf-8"?>
 <pc:chgInfo xmlns:a="http://schemas.openxmlformats.org/drawingml/2006/main" xmlns:r="http://schemas.openxmlformats.org/officeDocument/2006/relationships" xmlns:ac="http://schemas.microsoft.com/office/drawing/2013/main/command" xmlns:pc="http://schemas.microsoft.com/office/powerpoint/2013/main/command">
-  <pc:docChgLst>
-    <pc:chgData name="Suren Mohandass" userId="7d651f86-eb57-4558-b56c-97c886fa0419" providerId="ADAL" clId="{19435DF3-B4B2-4EDA-9FF8-F5D9012BBED1}"/>
-    <pc:docChg chg="modSld">
-      <pc:chgData name="Suren Mohandass" userId="7d651f86-eb57-4558-b56c-97c886fa0419" providerId="ADAL" clId="{19435DF3-B4B2-4EDA-9FF8-F5D9012BBED1}" dt="2021-12-02T14:28:24.408" v="6" actId="478"/>
-      <pc:docMkLst>
-        <pc:docMk/>
-      </pc:docMkLst>
-      <pc:sldChg chg="modSp modAnim">
-        <pc:chgData name="Suren Mohandass" userId="7d651f86-eb57-4558-b56c-97c886fa0419" providerId="ADAL" clId="{19435DF3-B4B2-4EDA-9FF8-F5D9012BBED1}" dt="2021-12-02T14:28:24.408" v="6" actId="478"/>
-        <pc:sldMkLst>
-          <pc:docMk/>
-          <pc:sldMk cId="2611908054" sldId="2076138299"/>
-        </pc:sldMkLst>
-        <pc:graphicFrameChg chg="mod">
-          <ac:chgData name="Suren Mohandass" userId="7d651f86-eb57-4558-b56c-97c886fa0419" providerId="ADAL" clId="{19435DF3-B4B2-4EDA-9FF8-F5D9012BBED1}" dt="2021-12-02T14:28:24.408" v="6" actId="478"/>
-          <ac:graphicFrameMkLst>
-            <pc:docMk/>
-            <pc:sldMk cId="2611908054" sldId="2076138299"/>
-            <ac:graphicFrameMk id="6" creationId="{3FD1431D-ED2B-4738-AB8F-D138080C9569}"/>
-          </ac:graphicFrameMkLst>
-        </pc:graphicFrameChg>
-      </pc:sldChg>
-      <pc:sldChg chg="modSp modAnim">
-        <pc:chgData name="Suren Mohandass" userId="7d651f86-eb57-4558-b56c-97c886fa0419" providerId="ADAL" clId="{19435DF3-B4B2-4EDA-9FF8-F5D9012BBED1}" dt="2021-12-02T14:28:11.942" v="1" actId="20577"/>
-        <pc:sldMkLst>
-          <pc:docMk/>
-          <pc:sldMk cId="3344460726" sldId="2076138457"/>
-        </pc:sldMkLst>
-        <pc:graphicFrameChg chg="mod">
-          <ac:chgData name="Suren Mohandass" userId="7d651f86-eb57-4558-b56c-97c886fa0419" providerId="ADAL" clId="{19435DF3-B4B2-4EDA-9FF8-F5D9012BBED1}" dt="2021-12-02T14:28:11.942" v="1" actId="20577"/>
-          <ac:graphicFrameMkLst>
-            <pc:docMk/>
-            <pc:sldMk cId="3344460726" sldId="2076138457"/>
-            <ac:graphicFrameMk id="4" creationId="{7B96820D-C894-4F11-90FE-9B4D89C5FD9E}"/>
-          </ac:graphicFrameMkLst>
-        </pc:graphicFrameChg>
-      </pc:sldChg>
-    </pc:docChg>
-  </pc:docChgLst>
   <pc:docChgLst>
     <pc:chgData name="Suren Mohandass" userId="7d651f86-eb57-4558-b56c-97c886fa0419" providerId="ADAL" clId="{8A21A0DF-4E72-41E1-AFE5-A574646A22A8}"/>
     <pc:docChg chg="custSel addSld delSld modSld modSection">
@@ -491,6 +456,37 @@
     </pc:docChg>
   </pc:docChgLst>
   <pc:docChgLst>
+    <pc:chgData name="Suren Mohandass" userId="7d651f86-eb57-4558-b56c-97c886fa0419" providerId="ADAL" clId="{C6178F98-CCA5-4EEB-9E01-ECFF0E3A5416}"/>
+    <pc:docChg chg="custSel modSld">
+      <pc:chgData name="Suren Mohandass" userId="7d651f86-eb57-4558-b56c-97c886fa0419" providerId="ADAL" clId="{C6178F98-CCA5-4EEB-9E01-ECFF0E3A5416}" dt="2021-05-06T08:32:28.211" v="6" actId="729"/>
+      <pc:docMkLst>
+        <pc:docMk/>
+      </pc:docMkLst>
+      <pc:sldChg chg="mod modShow">
+        <pc:chgData name="Suren Mohandass" userId="7d651f86-eb57-4558-b56c-97c886fa0419" providerId="ADAL" clId="{C6178F98-CCA5-4EEB-9E01-ECFF0E3A5416}" dt="2021-05-06T08:32:28.211" v="6" actId="729"/>
+        <pc:sldMkLst>
+          <pc:docMk/>
+          <pc:sldMk cId="2559220543" sldId="277"/>
+        </pc:sldMkLst>
+      </pc:sldChg>
+      <pc:sldChg chg="modSp mod">
+        <pc:chgData name="Suren Mohandass" userId="7d651f86-eb57-4558-b56c-97c886fa0419" providerId="ADAL" clId="{C6178F98-CCA5-4EEB-9E01-ECFF0E3A5416}" dt="2021-05-05T16:08:52.387" v="5" actId="20577"/>
+        <pc:sldMkLst>
+          <pc:docMk/>
+          <pc:sldMk cId="2611908054" sldId="2076138299"/>
+        </pc:sldMkLst>
+        <pc:graphicFrameChg chg="modGraphic">
+          <ac:chgData name="Suren Mohandass" userId="7d651f86-eb57-4558-b56c-97c886fa0419" providerId="ADAL" clId="{C6178F98-CCA5-4EEB-9E01-ECFF0E3A5416}" dt="2021-05-05T16:08:52.387" v="5" actId="20577"/>
+          <ac:graphicFrameMkLst>
+            <pc:docMk/>
+            <pc:sldMk cId="2611908054" sldId="2076138299"/>
+            <ac:graphicFrameMk id="6" creationId="{3FD1431D-ED2B-4738-AB8F-D138080C9569}"/>
+          </ac:graphicFrameMkLst>
+        </pc:graphicFrameChg>
+      </pc:sldChg>
+    </pc:docChg>
+  </pc:docChgLst>
+  <pc:docChgLst>
     <pc:chgData name="Suren Mohandass" userId="7d651f86-eb57-4558-b56c-97c886fa0419" providerId="ADAL" clId="{EAF90F1F-6744-45B2-B0CE-5E128EE37A29}"/>
     <pc:docChg chg="undo custSel addSld delSld modSld modSection">
       <pc:chgData name="Suren Mohandass" userId="7d651f86-eb57-4558-b56c-97c886fa0419" providerId="ADAL" clId="{EAF90F1F-6744-45B2-B0CE-5E128EE37A29}" dt="2021-06-29T11:37:04.620" v="973" actId="20577"/>
@@ -620,37 +616,6 @@
             <ac:spMk id="3" creationId="{DE9F713B-9128-433E-8D16-6A14591CDBC9}"/>
           </ac:spMkLst>
         </pc:spChg>
-      </pc:sldChg>
-    </pc:docChg>
-  </pc:docChgLst>
-  <pc:docChgLst>
-    <pc:chgData name="Suren Mohandass" userId="7d651f86-eb57-4558-b56c-97c886fa0419" providerId="ADAL" clId="{C6178F98-CCA5-4EEB-9E01-ECFF0E3A5416}"/>
-    <pc:docChg chg="custSel modSld">
-      <pc:chgData name="Suren Mohandass" userId="7d651f86-eb57-4558-b56c-97c886fa0419" providerId="ADAL" clId="{C6178F98-CCA5-4EEB-9E01-ECFF0E3A5416}" dt="2021-05-06T08:32:28.211" v="6" actId="729"/>
-      <pc:docMkLst>
-        <pc:docMk/>
-      </pc:docMkLst>
-      <pc:sldChg chg="mod modShow">
-        <pc:chgData name="Suren Mohandass" userId="7d651f86-eb57-4558-b56c-97c886fa0419" providerId="ADAL" clId="{C6178F98-CCA5-4EEB-9E01-ECFF0E3A5416}" dt="2021-05-06T08:32:28.211" v="6" actId="729"/>
-        <pc:sldMkLst>
-          <pc:docMk/>
-          <pc:sldMk cId="2559220543" sldId="277"/>
-        </pc:sldMkLst>
-      </pc:sldChg>
-      <pc:sldChg chg="modSp mod">
-        <pc:chgData name="Suren Mohandass" userId="7d651f86-eb57-4558-b56c-97c886fa0419" providerId="ADAL" clId="{C6178F98-CCA5-4EEB-9E01-ECFF0E3A5416}" dt="2021-05-05T16:08:52.387" v="5" actId="20577"/>
-        <pc:sldMkLst>
-          <pc:docMk/>
-          <pc:sldMk cId="2611908054" sldId="2076138299"/>
-        </pc:sldMkLst>
-        <pc:graphicFrameChg chg="modGraphic">
-          <ac:chgData name="Suren Mohandass" userId="7d651f86-eb57-4558-b56c-97c886fa0419" providerId="ADAL" clId="{C6178F98-CCA5-4EEB-9E01-ECFF0E3A5416}" dt="2021-05-05T16:08:52.387" v="5" actId="20577"/>
-          <ac:graphicFrameMkLst>
-            <pc:docMk/>
-            <pc:sldMk cId="2611908054" sldId="2076138299"/>
-            <ac:graphicFrameMk id="6" creationId="{3FD1431D-ED2B-4738-AB8F-D138080C9569}"/>
-          </ac:graphicFrameMkLst>
-        </pc:graphicFrameChg>
       </pc:sldChg>
     </pc:docChg>
   </pc:docChgLst>
@@ -903,6 +868,45 @@
           </pc:sldLayoutMkLst>
         </pc:sldLayoutChg>
       </pc:sldMasterChg>
+    </pc:docChg>
+  </pc:docChgLst>
+  <pc:docChgLst>
+    <pc:chgData name="Suren Mohandass" userId="7d651f86-eb57-4558-b56c-97c886fa0419" providerId="ADAL" clId="{19435DF3-B4B2-4EDA-9FF8-F5D9012BBED1}"/>
+    <pc:docChg chg="modSld">
+      <pc:chgData name="Suren Mohandass" userId="7d651f86-eb57-4558-b56c-97c886fa0419" providerId="ADAL" clId="{19435DF3-B4B2-4EDA-9FF8-F5D9012BBED1}" dt="2021-12-02T14:28:24.408" v="6" actId="478"/>
+      <pc:docMkLst>
+        <pc:docMk/>
+      </pc:docMkLst>
+      <pc:sldChg chg="modSp modAnim">
+        <pc:chgData name="Suren Mohandass" userId="7d651f86-eb57-4558-b56c-97c886fa0419" providerId="ADAL" clId="{19435DF3-B4B2-4EDA-9FF8-F5D9012BBED1}" dt="2021-12-02T14:28:24.408" v="6" actId="478"/>
+        <pc:sldMkLst>
+          <pc:docMk/>
+          <pc:sldMk cId="2611908054" sldId="2076138299"/>
+        </pc:sldMkLst>
+        <pc:graphicFrameChg chg="mod">
+          <ac:chgData name="Suren Mohandass" userId="7d651f86-eb57-4558-b56c-97c886fa0419" providerId="ADAL" clId="{19435DF3-B4B2-4EDA-9FF8-F5D9012BBED1}" dt="2021-12-02T14:28:24.408" v="6" actId="478"/>
+          <ac:graphicFrameMkLst>
+            <pc:docMk/>
+            <pc:sldMk cId="2611908054" sldId="2076138299"/>
+            <ac:graphicFrameMk id="6" creationId="{3FD1431D-ED2B-4738-AB8F-D138080C9569}"/>
+          </ac:graphicFrameMkLst>
+        </pc:graphicFrameChg>
+      </pc:sldChg>
+      <pc:sldChg chg="modSp modAnim">
+        <pc:chgData name="Suren Mohandass" userId="7d651f86-eb57-4558-b56c-97c886fa0419" providerId="ADAL" clId="{19435DF3-B4B2-4EDA-9FF8-F5D9012BBED1}" dt="2021-12-02T14:28:11.942" v="1" actId="20577"/>
+        <pc:sldMkLst>
+          <pc:docMk/>
+          <pc:sldMk cId="3344460726" sldId="2076138457"/>
+        </pc:sldMkLst>
+        <pc:graphicFrameChg chg="mod">
+          <ac:chgData name="Suren Mohandass" userId="7d651f86-eb57-4558-b56c-97c886fa0419" providerId="ADAL" clId="{19435DF3-B4B2-4EDA-9FF8-F5D9012BBED1}" dt="2021-12-02T14:28:11.942" v="1" actId="20577"/>
+          <ac:graphicFrameMkLst>
+            <pc:docMk/>
+            <pc:sldMk cId="3344460726" sldId="2076138457"/>
+            <ac:graphicFrameMk id="4" creationId="{7B96820D-C894-4F11-90FE-9B4D89C5FD9E}"/>
+          </ac:graphicFrameMkLst>
+        </pc:graphicFrameChg>
+      </pc:sldChg>
     </pc:docChg>
   </pc:docChgLst>
 </pc:chgInfo>
@@ -23133,7 +23137,7 @@
               <a:rPr lang="en-US" smtClean="0">
                 <a:latin typeface="Segoe UI" pitchFamily="34" charset="0"/>
               </a:rPr>
-              <a:t>12/2/2021 2:28 PM</a:t>
+              <a:t>1/4/2023 8:39 AM</a:t>
             </a:fld>
             <a:endParaRPr lang="en-US" dirty="0">
               <a:latin typeface="Segoe UI" pitchFamily="34" charset="0"/>
@@ -23411,7 +23415,7 @@
           <a:p>
             <a:fld id="{386CE63F-9E7F-4C04-9D0D-FCA25A8E9E86}" type="datetime8">
               <a:rPr lang="en-US" smtClean="0"/>
-              <a:t>12/2/2021 2:27 PM</a:t>
+              <a:t>1/4/2023 8:39 AM</a:t>
             </a:fld>
             <a:endParaRPr lang="en-US" dirty="0"/>
           </a:p>
@@ -23824,7 +23828,7 @@
                   <a:prstClr val="black"/>
                 </a:solidFill>
               </a:rPr>
-              <a:t>12/2/2021 2:27 PM</a:t>
+              <a:t>1/4/2023 8:39 AM</a:t>
             </a:fld>
             <a:endParaRPr lang="en-US" dirty="0">
               <a:solidFill>
@@ -23856,7 +23860,7 @@
                 </a:solidFill>
               </a:rPr>
               <a:pPr/>
-              <a:t>11</a:t>
+              <a:t>13</a:t>
             </a:fld>
             <a:endParaRPr lang="en-US" dirty="0">
               <a:solidFill>
@@ -24261,7 +24265,7 @@
           <a:p>
             <a:fld id="{386CE63F-9E7F-4C04-9D0D-FCA25A8E9E86}" type="datetime8">
               <a:rPr lang="en-US" smtClean="0"/>
-              <a:t>12/2/2021 2:27 PM</a:t>
+              <a:t>1/4/2023 8:39 AM</a:t>
             </a:fld>
             <a:endParaRPr lang="en-US" dirty="0"/>
           </a:p>
@@ -24468,7 +24472,7 @@
           <a:p>
             <a:fld id="{386CE63F-9E7F-4C04-9D0D-FCA25A8E9E86}" type="datetime8">
               <a:rPr lang="en-US" smtClean="0"/>
-              <a:t>12/2/2021 2:27 PM</a:t>
+              <a:t>1/4/2023 8:39 AM</a:t>
             </a:fld>
             <a:endParaRPr lang="en-US" dirty="0"/>
           </a:p>
@@ -24649,7 +24653,7 @@
           <a:p>
             <a:fld id="{386CE63F-9E7F-4C04-9D0D-FCA25A8E9E86}" type="datetime8">
               <a:rPr lang="en-US" smtClean="0"/>
-              <a:t>12/2/2021 2:27 PM</a:t>
+              <a:t>1/4/2023 8:39 AM</a:t>
             </a:fld>
             <a:endParaRPr lang="en-US" dirty="0"/>
           </a:p>
@@ -24673,7 +24677,7 @@
             <a:fld id="{B4008EB6-D09E-4580-8CD6-DDB14511944F}" type="slidenum">
               <a:rPr lang="en-US" smtClean="0"/>
               <a:pPr/>
-              <a:t>6</a:t>
+              <a:t>7</a:t>
             </a:fld>
             <a:endParaRPr lang="en-US" dirty="0"/>
           </a:p>
@@ -24834,7 +24838,7 @@
           <a:p>
             <a:fld id="{386CE63F-9E7F-4C04-9D0D-FCA25A8E9E86}" type="datetime8">
               <a:rPr lang="en-US" smtClean="0"/>
-              <a:t>12/2/2021 2:27 PM</a:t>
+              <a:t>1/4/2023 8:39 AM</a:t>
             </a:fld>
             <a:endParaRPr lang="en-US" dirty="0"/>
           </a:p>
@@ -24858,7 +24862,7 @@
             <a:fld id="{B4008EB6-D09E-4580-8CD6-DDB14511944F}" type="slidenum">
               <a:rPr lang="en-US" smtClean="0"/>
               <a:pPr/>
-              <a:t>7</a:t>
+              <a:t>8</a:t>
             </a:fld>
             <a:endParaRPr lang="en-US" dirty="0"/>
           </a:p>
@@ -25014,7 +25018,7 @@
           <a:p>
             <a:fld id="{72E0C910-0166-48E0-B8EF-5071277A02A8}" type="datetime8">
               <a:rPr lang="en-US" smtClean="0"/>
-              <a:t>12/2/2021 2:27 PM</a:t>
+              <a:t>1/4/2023 8:39 AM</a:t>
             </a:fld>
             <a:endParaRPr lang="en-US" dirty="0"/>
           </a:p>
@@ -25038,7 +25042,7 @@
             <a:fld id="{B4008EB6-D09E-4580-8CD6-DDB14511944F}" type="slidenum">
               <a:rPr lang="en-US" smtClean="0"/>
               <a:pPr/>
-              <a:t>8</a:t>
+              <a:t>9</a:t>
             </a:fld>
             <a:endParaRPr lang="en-US" dirty="0"/>
           </a:p>
@@ -25194,7 +25198,7 @@
           <a:p>
             <a:fld id="{72E0C910-0166-48E0-B8EF-5071277A02A8}" type="datetime8">
               <a:rPr lang="en-US" smtClean="0"/>
-              <a:t>12/2/2021 2:27 PM</a:t>
+              <a:t>1/4/2023 8:39 AM</a:t>
             </a:fld>
             <a:endParaRPr lang="en-US" dirty="0"/>
           </a:p>
@@ -25218,7 +25222,7 @@
             <a:fld id="{B4008EB6-D09E-4580-8CD6-DDB14511944F}" type="slidenum">
               <a:rPr lang="en-US" smtClean="0"/>
               <a:pPr/>
-              <a:t>9</a:t>
+              <a:t>10</a:t>
             </a:fld>
             <a:endParaRPr lang="en-US" dirty="0"/>
           </a:p>
@@ -25359,7 +25363,7 @@
           <a:p>
             <a:fld id="{9427A7F7-BB1E-479D-AFAA-B52F4D0C99F2}" type="datetime8">
               <a:rPr lang="en-US" smtClean="0"/>
-              <a:t>12/2/2021 2:27 PM</a:t>
+              <a:t>1/4/2023 8:39 AM</a:t>
             </a:fld>
             <a:endParaRPr lang="en-US" dirty="0"/>
           </a:p>
@@ -25383,7 +25387,7 @@
             <a:fld id="{B4008EB6-D09E-4580-8CD6-DDB14511944F}" type="slidenum">
               <a:rPr lang="en-US" smtClean="0"/>
               <a:pPr/>
-              <a:t>10</a:t>
+              <a:t>12</a:t>
             </a:fld>
             <a:endParaRPr lang="en-US" dirty="0"/>
           </a:p>
@@ -36382,8 +36386,8 @@
         </p:nvSpPr>
         <p:spPr>
           <a:xfrm>
-            <a:off x="588263" y="2979539"/>
-            <a:ext cx="4579730" cy="553998"/>
+            <a:off x="588263" y="2425541"/>
+            <a:ext cx="4579730" cy="1107996"/>
           </a:xfrm>
         </p:spPr>
         <p:txBody>
@@ -36392,7 +36396,14 @@
           <a:p>
             <a:r>
               <a:rPr lang="en-US" dirty="0"/>
-              <a:t>Infrastructure-as-Code</a:t>
+              <a:t>Infrastructure as Code</a:t>
+            </a:r>
+            <a:br>
+              <a:rPr lang="en-US" dirty="0"/>
+            </a:br>
+            <a:r>
+              <a:rPr lang="en-US" dirty="0"/>
+              <a:t>with Terraform</a:t>
             </a:r>
           </a:p>
         </p:txBody>
@@ -36492,6 +36503,637 @@
           <a:chExt cx="0" cy="0"/>
         </a:xfrm>
       </p:grpSpPr>
+      <p:sp>
+        <p:nvSpPr>
+          <p:cNvPr id="17" name="Title 16"/>
+          <p:cNvSpPr>
+            <a:spLocks noGrp="1"/>
+          </p:cNvSpPr>
+          <p:nvPr>
+            <p:ph type="title"/>
+          </p:nvPr>
+        </p:nvSpPr>
+        <p:spPr/>
+        <p:txBody>
+          <a:bodyPr/>
+          <a:lstStyle/>
+          <a:p>
+            <a:r>
+              <a:rPr lang="en-US" dirty="0"/>
+              <a:t>Getting hands-on</a:t>
+            </a:r>
+          </a:p>
+        </p:txBody>
+      </p:sp>
+      <p:graphicFrame>
+        <p:nvGraphicFramePr>
+          <p:cNvPr id="3" name="Diagram 2">
+            <a:extLst>
+              <a:ext uri="{FF2B5EF4-FFF2-40B4-BE49-F238E27FC236}">
+                <a16:creationId xmlns:a16="http://schemas.microsoft.com/office/drawing/2014/main" id="{4570497C-3652-49FA-AD68-C673FE6AF973}"/>
+              </a:ext>
+            </a:extLst>
+          </p:cNvPr>
+          <p:cNvGraphicFramePr/>
+          <p:nvPr>
+            <p:extLst>
+              <p:ext uri="{D42A27DB-BD31-4B8C-83A1-F6EECF244321}">
+                <p14:modId xmlns:p14="http://schemas.microsoft.com/office/powerpoint/2010/main" val="1048614019"/>
+              </p:ext>
+            </p:extLst>
+          </p:nvPr>
+        </p:nvGraphicFramePr>
+        <p:xfrm>
+          <a:off x="588262" y="1452979"/>
+          <a:ext cx="11314435" cy="3939540"/>
+        </p:xfrm>
+        <a:graphic>
+          <a:graphicData uri="http://schemas.openxmlformats.org/drawingml/2006/diagram">
+            <dgm:relIds xmlns:dgm="http://schemas.openxmlformats.org/drawingml/2006/diagram" xmlns:r="http://schemas.openxmlformats.org/officeDocument/2006/relationships" r:dm="rId3" r:lo="rId4" r:qs="rId5" r:cs="rId6"/>
+          </a:graphicData>
+        </a:graphic>
+      </p:graphicFrame>
+    </p:spTree>
+    <p:extLst>
+      <p:ext uri="{BB962C8B-B14F-4D97-AF65-F5344CB8AC3E}">
+        <p14:creationId xmlns:p14="http://schemas.microsoft.com/office/powerpoint/2010/main" val="1391954703"/>
+      </p:ext>
+    </p:extLst>
+  </p:cSld>
+  <p:clrMapOvr>
+    <a:masterClrMapping/>
+  </p:clrMapOvr>
+  <mc:AlternateContent xmlns:mc="http://schemas.openxmlformats.org/markup-compatibility/2006" xmlns:p14="http://schemas.microsoft.com/office/powerpoint/2010/main">
+    <mc:Choice Requires="p14">
+      <p:transition spd="med" p14:dur="700">
+        <p:fade/>
+      </p:transition>
+    </mc:Choice>
+    <mc:Fallback xmlns="">
+      <p:transition spd="med">
+        <p:fade/>
+      </p:transition>
+    </mc:Fallback>
+  </mc:AlternateContent>
+</p:sld>
+</file>
+
+<file path=ppt/slides/slide11.xml><?xml version="1.0" encoding="utf-8"?>
+<p:sld xmlns:a="http://schemas.openxmlformats.org/drawingml/2006/main" xmlns:r="http://schemas.openxmlformats.org/officeDocument/2006/relationships" xmlns:p="http://schemas.openxmlformats.org/presentationml/2006/main">
+  <p:cSld>
+    <p:spTree>
+      <p:nvGrpSpPr>
+        <p:cNvPr id="1" name=""/>
+        <p:cNvGrpSpPr/>
+        <p:nvPr/>
+      </p:nvGrpSpPr>
+      <p:grpSpPr>
+        <a:xfrm>
+          <a:off x="0" y="0"/>
+          <a:ext cx="0" cy="0"/>
+          <a:chOff x="0" y="0"/>
+          <a:chExt cx="0" cy="0"/>
+        </a:xfrm>
+      </p:grpSpPr>
+      <p:sp>
+        <p:nvSpPr>
+          <p:cNvPr id="4" name="Title 3">
+            <a:extLst>
+              <a:ext uri="{FF2B5EF4-FFF2-40B4-BE49-F238E27FC236}">
+                <a16:creationId xmlns:a16="http://schemas.microsoft.com/office/drawing/2014/main" id="{AA338D19-B6F7-5EE7-950C-3B8912832F34}"/>
+              </a:ext>
+            </a:extLst>
+          </p:cNvPr>
+          <p:cNvSpPr>
+            <a:spLocks noGrp="1"/>
+          </p:cNvSpPr>
+          <p:nvPr>
+            <p:ph type="title"/>
+          </p:nvPr>
+        </p:nvSpPr>
+        <p:spPr/>
+        <p:txBody>
+          <a:bodyPr/>
+          <a:lstStyle/>
+          <a:p>
+            <a:r>
+              <a:rPr lang="en-GB" dirty="0"/>
+              <a:t>Timings</a:t>
+            </a:r>
+          </a:p>
+        </p:txBody>
+      </p:sp>
+      <p:sp>
+        <p:nvSpPr>
+          <p:cNvPr id="5" name="Text Placeholder 4">
+            <a:extLst>
+              <a:ext uri="{FF2B5EF4-FFF2-40B4-BE49-F238E27FC236}">
+                <a16:creationId xmlns:a16="http://schemas.microsoft.com/office/drawing/2014/main" id="{AA537217-6B05-A117-4C52-0B12662859AD}"/>
+              </a:ext>
+            </a:extLst>
+          </p:cNvPr>
+          <p:cNvSpPr>
+            <a:spLocks noGrp="1"/>
+          </p:cNvSpPr>
+          <p:nvPr>
+            <p:ph type="body" sz="quarter" idx="11"/>
+          </p:nvPr>
+        </p:nvSpPr>
+        <p:spPr/>
+        <p:txBody>
+          <a:bodyPr/>
+          <a:lstStyle/>
+          <a:p>
+            <a:pPr marL="0" indent="0">
+              <a:spcBef>
+                <a:spcPts val="100"/>
+              </a:spcBef>
+              <a:spcAft>
+                <a:spcPts val="100"/>
+              </a:spcAft>
+              <a:buNone/>
+            </a:pPr>
+            <a:r>
+              <a:rPr lang="en-GB" sz="1100" b="1" dirty="0"/>
+              <a:t>Day 1</a:t>
+            </a:r>
+          </a:p>
+          <a:p>
+            <a:pPr marL="0" indent="0">
+              <a:spcBef>
+                <a:spcPts val="100"/>
+              </a:spcBef>
+              <a:spcAft>
+                <a:spcPts val="100"/>
+              </a:spcAft>
+              <a:buNone/>
+            </a:pPr>
+            <a:r>
+              <a:rPr lang="en-GB" sz="1100" dirty="0"/>
+              <a:t>09:30 - 10:00 - Introduction</a:t>
+            </a:r>
+          </a:p>
+          <a:p>
+            <a:pPr marL="0" indent="0">
+              <a:spcBef>
+                <a:spcPts val="100"/>
+              </a:spcBef>
+              <a:spcAft>
+                <a:spcPts val="100"/>
+              </a:spcAft>
+              <a:buNone/>
+            </a:pPr>
+            <a:r>
+              <a:rPr lang="en-GB" sz="1100" dirty="0"/>
+              <a:t>10:00 - 10:30 - IAC Bigger Picture</a:t>
+            </a:r>
+          </a:p>
+          <a:p>
+            <a:pPr marL="0" indent="0">
+              <a:spcBef>
+                <a:spcPts val="100"/>
+              </a:spcBef>
+              <a:spcAft>
+                <a:spcPts val="100"/>
+              </a:spcAft>
+              <a:buNone/>
+            </a:pPr>
+            <a:r>
+              <a:rPr lang="en-GB" sz="1100" dirty="0">
+                <a:solidFill>
+                  <a:srgbClr val="107C10"/>
+                </a:solidFill>
+              </a:rPr>
+              <a:t>10:30 - 11:00 - Break</a:t>
+            </a:r>
+          </a:p>
+          <a:p>
+            <a:pPr marL="0" indent="0">
+              <a:spcBef>
+                <a:spcPts val="100"/>
+              </a:spcBef>
+              <a:spcAft>
+                <a:spcPts val="100"/>
+              </a:spcAft>
+              <a:buNone/>
+            </a:pPr>
+            <a:r>
+              <a:rPr lang="en-GB" sz="1100" dirty="0"/>
+              <a:t>11:00 - 11:30 - Core Workflow</a:t>
+            </a:r>
+          </a:p>
+          <a:p>
+            <a:pPr marL="0" indent="0">
+              <a:spcBef>
+                <a:spcPts val="100"/>
+              </a:spcBef>
+              <a:spcAft>
+                <a:spcPts val="100"/>
+              </a:spcAft>
+              <a:buNone/>
+            </a:pPr>
+            <a:r>
+              <a:rPr lang="en-GB" sz="1100" dirty="0"/>
+              <a:t>11:30 - 12:30 - Lab 1 and Lab 2</a:t>
+            </a:r>
+          </a:p>
+          <a:p>
+            <a:pPr marL="0" indent="0">
+              <a:spcBef>
+                <a:spcPts val="100"/>
+              </a:spcBef>
+              <a:spcAft>
+                <a:spcPts val="100"/>
+              </a:spcAft>
+              <a:buNone/>
+            </a:pPr>
+            <a:r>
+              <a:rPr lang="en-GB" sz="1100" dirty="0">
+                <a:solidFill>
+                  <a:srgbClr val="107C10"/>
+                </a:solidFill>
+              </a:rPr>
+              <a:t>12:30 - 13:30 - Lunch</a:t>
+            </a:r>
+          </a:p>
+          <a:p>
+            <a:pPr marL="0" indent="0">
+              <a:spcBef>
+                <a:spcPts val="100"/>
+              </a:spcBef>
+              <a:spcAft>
+                <a:spcPts val="100"/>
+              </a:spcAft>
+              <a:buNone/>
+            </a:pPr>
+            <a:r>
+              <a:rPr lang="en-GB" sz="1100" dirty="0"/>
+              <a:t>13:30 - 13:45 - Expressions and Functions Part 1 - Expressions</a:t>
+            </a:r>
+          </a:p>
+          <a:p>
+            <a:pPr marL="0" indent="0">
+              <a:spcBef>
+                <a:spcPts val="100"/>
+              </a:spcBef>
+              <a:spcAft>
+                <a:spcPts val="100"/>
+              </a:spcAft>
+              <a:buNone/>
+            </a:pPr>
+            <a:r>
+              <a:rPr lang="en-GB" sz="1100" dirty="0"/>
+              <a:t>13:45 - 14:00 - Lab 3 - Expressions</a:t>
+            </a:r>
+          </a:p>
+          <a:p>
+            <a:pPr marL="0" indent="0">
+              <a:spcBef>
+                <a:spcPts val="100"/>
+              </a:spcBef>
+              <a:spcAft>
+                <a:spcPts val="100"/>
+              </a:spcAft>
+              <a:buNone/>
+            </a:pPr>
+            <a:r>
+              <a:rPr lang="en-GB" sz="1100" dirty="0"/>
+              <a:t>14:00 - 14:15 - Expressions and Functions Part 2 - Functions</a:t>
+            </a:r>
+          </a:p>
+          <a:p>
+            <a:pPr marL="0" indent="0">
+              <a:spcBef>
+                <a:spcPts val="100"/>
+              </a:spcBef>
+              <a:spcAft>
+                <a:spcPts val="100"/>
+              </a:spcAft>
+              <a:buNone/>
+            </a:pPr>
+            <a:r>
+              <a:rPr lang="en-GB" sz="1100" dirty="0"/>
+              <a:t>14:15 - 14:30 - Lab 3 - Functions</a:t>
+            </a:r>
+          </a:p>
+          <a:p>
+            <a:pPr marL="0" indent="0">
+              <a:spcBef>
+                <a:spcPts val="100"/>
+              </a:spcBef>
+              <a:spcAft>
+                <a:spcPts val="100"/>
+              </a:spcAft>
+              <a:buNone/>
+            </a:pPr>
+            <a:r>
+              <a:rPr lang="en-GB" sz="1100" dirty="0">
+                <a:solidFill>
+                  <a:srgbClr val="107C10"/>
+                </a:solidFill>
+              </a:rPr>
+              <a:t>14:30 - 15:00 - Break</a:t>
+            </a:r>
+          </a:p>
+          <a:p>
+            <a:pPr marL="0" indent="0">
+              <a:spcBef>
+                <a:spcPts val="100"/>
+              </a:spcBef>
+              <a:spcAft>
+                <a:spcPts val="100"/>
+              </a:spcAft>
+              <a:buNone/>
+            </a:pPr>
+            <a:r>
+              <a:rPr lang="en-GB" sz="1100" dirty="0"/>
+              <a:t>15:00 - 15:30 - Lab 4 - Importing resources and using data sources</a:t>
+            </a:r>
+          </a:p>
+          <a:p>
+            <a:pPr marL="0" indent="0">
+              <a:spcBef>
+                <a:spcPts val="100"/>
+              </a:spcBef>
+              <a:spcAft>
+                <a:spcPts val="100"/>
+              </a:spcAft>
+              <a:buNone/>
+            </a:pPr>
+            <a:r>
+              <a:rPr lang="en-GB" sz="1100" dirty="0"/>
+              <a:t>15:30 - 15:45 - Dependencies and Modules - Part 1 Dependencies</a:t>
+            </a:r>
+          </a:p>
+          <a:p>
+            <a:pPr marL="0" indent="0">
+              <a:spcBef>
+                <a:spcPts val="100"/>
+              </a:spcBef>
+              <a:spcAft>
+                <a:spcPts val="100"/>
+              </a:spcAft>
+              <a:buNone/>
+            </a:pPr>
+            <a:r>
+              <a:rPr lang="en-GB" sz="1100" dirty="0"/>
+              <a:t>15:45 - 16:15 - Lab 5 - Dependencies</a:t>
+            </a:r>
+          </a:p>
+          <a:p>
+            <a:pPr marL="0" indent="0">
+              <a:spcBef>
+                <a:spcPts val="100"/>
+              </a:spcBef>
+              <a:spcAft>
+                <a:spcPts val="100"/>
+              </a:spcAft>
+              <a:buNone/>
+            </a:pPr>
+            <a:r>
+              <a:rPr lang="en-GB" sz="1100" dirty="0"/>
+              <a:t>16:15 - 17:00 - Dependencies and Modules - Part 2 Modules</a:t>
+            </a:r>
+          </a:p>
+          <a:p>
+            <a:pPr marL="0" indent="0">
+              <a:spcBef>
+                <a:spcPts val="100"/>
+              </a:spcBef>
+              <a:spcAft>
+                <a:spcPts val="100"/>
+              </a:spcAft>
+              <a:buNone/>
+            </a:pPr>
+            <a:endParaRPr lang="en-GB" sz="1100" dirty="0"/>
+          </a:p>
+          <a:p>
+            <a:pPr marL="0" indent="0">
+              <a:spcBef>
+                <a:spcPts val="100"/>
+              </a:spcBef>
+              <a:spcAft>
+                <a:spcPts val="100"/>
+              </a:spcAft>
+              <a:buNone/>
+            </a:pPr>
+            <a:r>
+              <a:rPr lang="en-GB" sz="1100" b="1" dirty="0"/>
+              <a:t>Day 2</a:t>
+            </a:r>
+          </a:p>
+          <a:p>
+            <a:pPr marL="0" indent="0">
+              <a:spcBef>
+                <a:spcPts val="100"/>
+              </a:spcBef>
+              <a:spcAft>
+                <a:spcPts val="100"/>
+              </a:spcAft>
+              <a:buNone/>
+            </a:pPr>
+            <a:r>
+              <a:rPr lang="en-GB" sz="1100" dirty="0"/>
+              <a:t>09:30 - 10:00 - Lab 6 - Modules</a:t>
+            </a:r>
+          </a:p>
+          <a:p>
+            <a:pPr marL="0" indent="0">
+              <a:spcBef>
+                <a:spcPts val="100"/>
+              </a:spcBef>
+              <a:spcAft>
+                <a:spcPts val="100"/>
+              </a:spcAft>
+              <a:buNone/>
+            </a:pPr>
+            <a:r>
+              <a:rPr lang="en-GB" sz="1100" dirty="0"/>
+              <a:t>10:00 - 10:15 - State Management and Provisioning - Part 1 Remote State</a:t>
+            </a:r>
+          </a:p>
+          <a:p>
+            <a:pPr marL="0" indent="0">
+              <a:spcBef>
+                <a:spcPts val="100"/>
+              </a:spcBef>
+              <a:spcAft>
+                <a:spcPts val="100"/>
+              </a:spcAft>
+              <a:buNone/>
+            </a:pPr>
+            <a:r>
+              <a:rPr lang="en-GB" sz="1100" dirty="0">
+                <a:solidFill>
+                  <a:srgbClr val="107C10"/>
+                </a:solidFill>
+              </a:rPr>
+              <a:t>10:15 - 10:45 - Break</a:t>
+            </a:r>
+          </a:p>
+          <a:p>
+            <a:pPr marL="0" indent="0">
+              <a:spcBef>
+                <a:spcPts val="100"/>
+              </a:spcBef>
+              <a:spcAft>
+                <a:spcPts val="100"/>
+              </a:spcAft>
+              <a:buNone/>
+            </a:pPr>
+            <a:r>
+              <a:rPr lang="en-GB" sz="1100" dirty="0"/>
+              <a:t>10:45 - 11:15 - Lab 7 - Remote state</a:t>
+            </a:r>
+          </a:p>
+          <a:p>
+            <a:pPr marL="0" indent="0">
+              <a:spcBef>
+                <a:spcPts val="100"/>
+              </a:spcBef>
+              <a:spcAft>
+                <a:spcPts val="100"/>
+              </a:spcAft>
+              <a:buNone/>
+            </a:pPr>
+            <a:r>
+              <a:rPr lang="en-GB" sz="1100" dirty="0"/>
+              <a:t>11:15 - 11:30 - State Management and Provisioning - Part 2 Workspaces</a:t>
+            </a:r>
+          </a:p>
+          <a:p>
+            <a:pPr marL="0" indent="0">
+              <a:spcBef>
+                <a:spcPts val="100"/>
+              </a:spcBef>
+              <a:spcAft>
+                <a:spcPts val="100"/>
+              </a:spcAft>
+              <a:buNone/>
+            </a:pPr>
+            <a:r>
+              <a:rPr lang="en-GB" sz="1100" dirty="0"/>
+              <a:t>11:30 - 11:45 - Lab 8.1 - Workspaces</a:t>
+            </a:r>
+          </a:p>
+          <a:p>
+            <a:pPr marL="0" indent="0">
+              <a:spcBef>
+                <a:spcPts val="100"/>
+              </a:spcBef>
+              <a:spcAft>
+                <a:spcPts val="100"/>
+              </a:spcAft>
+              <a:buNone/>
+            </a:pPr>
+            <a:r>
+              <a:rPr lang="en-GB" sz="1100" dirty="0"/>
+              <a:t>11:45 - 12:30 - Continuous Delivery</a:t>
+            </a:r>
+          </a:p>
+          <a:p>
+            <a:pPr marL="0" indent="0">
+              <a:spcBef>
+                <a:spcPts val="100"/>
+              </a:spcBef>
+              <a:spcAft>
+                <a:spcPts val="100"/>
+              </a:spcAft>
+              <a:buNone/>
+            </a:pPr>
+            <a:r>
+              <a:rPr lang="en-GB" sz="1100" dirty="0">
+                <a:solidFill>
+                  <a:srgbClr val="107C10"/>
+                </a:solidFill>
+              </a:rPr>
+              <a:t>12:30 - 13:30 - Lunch</a:t>
+            </a:r>
+          </a:p>
+          <a:p>
+            <a:pPr marL="0" indent="0">
+              <a:spcBef>
+                <a:spcPts val="100"/>
+              </a:spcBef>
+              <a:spcAft>
+                <a:spcPts val="100"/>
+              </a:spcAft>
+              <a:buNone/>
+            </a:pPr>
+            <a:r>
+              <a:rPr lang="en-GB" sz="1100" dirty="0"/>
+              <a:t>13:30 - 15:00 - Continuous Delivery Lab</a:t>
+            </a:r>
+          </a:p>
+          <a:p>
+            <a:pPr marL="0" indent="0">
+              <a:spcBef>
+                <a:spcPts val="100"/>
+              </a:spcBef>
+              <a:spcAft>
+                <a:spcPts val="100"/>
+              </a:spcAft>
+              <a:buNone/>
+            </a:pPr>
+            <a:r>
+              <a:rPr lang="en-GB" sz="1100" dirty="0">
+                <a:solidFill>
+                  <a:srgbClr val="107C10"/>
+                </a:solidFill>
+              </a:rPr>
+              <a:t>15:00 – 15:30 - Break</a:t>
+            </a:r>
+          </a:p>
+          <a:p>
+            <a:pPr marL="0" indent="0">
+              <a:spcBef>
+                <a:spcPts val="100"/>
+              </a:spcBef>
+              <a:spcAft>
+                <a:spcPts val="100"/>
+              </a:spcAft>
+              <a:buNone/>
+            </a:pPr>
+            <a:r>
+              <a:rPr lang="en-GB" sz="1100" dirty="0"/>
+              <a:t>15:30 - 17:00 - Other labs, Q&amp;A, deep dive into any subjects</a:t>
+            </a:r>
+          </a:p>
+        </p:txBody>
+      </p:sp>
+    </p:spTree>
+    <p:extLst>
+      <p:ext uri="{BB962C8B-B14F-4D97-AF65-F5344CB8AC3E}">
+        <p14:creationId xmlns:p14="http://schemas.microsoft.com/office/powerpoint/2010/main" val="624095391"/>
+      </p:ext>
+    </p:extLst>
+  </p:cSld>
+  <p:clrMapOvr>
+    <a:masterClrMapping/>
+  </p:clrMapOvr>
+  <p:transition>
+    <p:fade/>
+  </p:transition>
+</p:sld>
+</file>
+
+<file path=ppt/slides/slide12.xml><?xml version="1.0" encoding="utf-8"?>
+<p:sld xmlns:a="http://schemas.openxmlformats.org/drawingml/2006/main" xmlns:r="http://schemas.openxmlformats.org/officeDocument/2006/relationships" xmlns:p="http://schemas.openxmlformats.org/presentationml/2006/main">
+  <p:cSld>
+    <p:spTree>
+      <p:nvGrpSpPr>
+        <p:cNvPr id="1" name=""/>
+        <p:cNvGrpSpPr/>
+        <p:nvPr/>
+      </p:nvGrpSpPr>
+      <p:grpSpPr>
+        <a:xfrm>
+          <a:off x="0" y="0"/>
+          <a:ext cx="0" cy="0"/>
+          <a:chOff x="0" y="0"/>
+          <a:chExt cx="0" cy="0"/>
+        </a:xfrm>
+      </p:grpSpPr>
       <p:graphicFrame>
         <p:nvGraphicFramePr>
           <p:cNvPr id="2" name="Diagram 1">
@@ -36570,7 +37212,7 @@
 </p:sld>
 </file>
 
-<file path=ppt/slides/slide11.xml><?xml version="1.0" encoding="utf-8"?>
+<file path=ppt/slides/slide13.xml><?xml version="1.0" encoding="utf-8"?>
 <p:sld xmlns:a="http://schemas.openxmlformats.org/drawingml/2006/main" xmlns:r="http://schemas.openxmlformats.org/officeDocument/2006/relationships" xmlns:p="http://schemas.openxmlformats.org/presentationml/2006/main">
   <p:cSld>
     <p:spTree>
@@ -37292,6 +37934,266 @@
           <p:cNvPr id="2" name="Title 1">
             <a:extLst>
               <a:ext uri="{FF2B5EF4-FFF2-40B4-BE49-F238E27FC236}">
+                <a16:creationId xmlns:a16="http://schemas.microsoft.com/office/drawing/2014/main" id="{2731C5BF-2587-AA43-8D00-4B95D90A112D}"/>
+              </a:ext>
+            </a:extLst>
+          </p:cNvPr>
+          <p:cNvSpPr>
+            <a:spLocks noGrp="1"/>
+          </p:cNvSpPr>
+          <p:nvPr>
+            <p:ph type="title"/>
+          </p:nvPr>
+        </p:nvSpPr>
+        <p:spPr/>
+        <p:txBody>
+          <a:bodyPr/>
+          <a:lstStyle/>
+          <a:p>
+            <a:r>
+              <a:rPr lang="en-US" dirty="0"/>
+              <a:t>Requirements for Labs</a:t>
+            </a:r>
+          </a:p>
+        </p:txBody>
+      </p:sp>
+      <p:sp>
+        <p:nvSpPr>
+          <p:cNvPr id="3" name="Text Placeholder 2">
+            <a:extLst>
+              <a:ext uri="{FF2B5EF4-FFF2-40B4-BE49-F238E27FC236}">
+                <a16:creationId xmlns:a16="http://schemas.microsoft.com/office/drawing/2014/main" id="{F39D18C1-892E-774C-A583-DD3BE9301A12}"/>
+              </a:ext>
+            </a:extLst>
+          </p:cNvPr>
+          <p:cNvSpPr>
+            <a:spLocks noGrp="1"/>
+          </p:cNvSpPr>
+          <p:nvPr>
+            <p:ph type="body" sz="quarter" idx="11"/>
+          </p:nvPr>
+        </p:nvSpPr>
+        <p:spPr/>
+        <p:txBody>
+          <a:bodyPr/>
+          <a:lstStyle/>
+          <a:p>
+            <a:r>
+              <a:rPr lang="en-US" sz="1800" dirty="0"/>
+              <a:t>Laptop with Windows, MacOS or Linux</a:t>
+            </a:r>
+          </a:p>
+          <a:p>
+            <a:pPr lvl="1"/>
+            <a:r>
+              <a:rPr lang="en-US" sz="1000" dirty="0"/>
+              <a:t>Recommend using a Personal Laptop outside of the corporate network.</a:t>
+            </a:r>
+          </a:p>
+          <a:p>
+            <a:pPr lvl="1"/>
+            <a:r>
+              <a:rPr lang="en-US" sz="1000" dirty="0"/>
+              <a:t>Must have privileges to install software (e.g. Terraform CLI).</a:t>
+            </a:r>
+          </a:p>
+          <a:p>
+            <a:pPr lvl="1"/>
+            <a:r>
+              <a:rPr lang="en-US" sz="1000" dirty="0"/>
+              <a:t>Must have a modern browser with unrestricted internet access.</a:t>
+            </a:r>
+          </a:p>
+          <a:p>
+            <a:pPr marL="228600" lvl="1" indent="0">
+              <a:buNone/>
+            </a:pPr>
+            <a:endParaRPr lang="en-US" sz="1000" dirty="0"/>
+          </a:p>
+          <a:p>
+            <a:r>
+              <a:rPr lang="en-US" sz="1800" dirty="0"/>
+              <a:t>Sandbox Azure with Full Access to </a:t>
+            </a:r>
+            <a:r>
+              <a:rPr lang="en-US" sz="1800" dirty="0" err="1"/>
+              <a:t>AzureAD</a:t>
+            </a:r>
+            <a:r>
+              <a:rPr lang="en-US" sz="1800" dirty="0"/>
+              <a:t> and a Subscription.</a:t>
+            </a:r>
+          </a:p>
+          <a:p>
+            <a:pPr lvl="1"/>
+            <a:r>
+              <a:rPr lang="en-US" sz="1000" dirty="0"/>
+              <a:t>Recommend using Azure Free Account: </a:t>
+            </a:r>
+            <a:r>
+              <a:rPr lang="en-GB" sz="1000" dirty="0">
+                <a:hlinkClick r:id="rId2"/>
+              </a:rPr>
+              <a:t>https://azure.microsoft.com/en-gb/free</a:t>
+            </a:r>
+            <a:endParaRPr lang="en-GB" sz="1000" dirty="0"/>
+          </a:p>
+          <a:p>
+            <a:pPr marL="228600" lvl="1" indent="0">
+              <a:buNone/>
+            </a:pPr>
+            <a:endParaRPr lang="en-US" sz="1000" dirty="0"/>
+          </a:p>
+          <a:p>
+            <a:r>
+              <a:rPr lang="en-US" sz="1800" dirty="0"/>
+              <a:t>GitHub Organization with full admin rights</a:t>
+            </a:r>
+          </a:p>
+          <a:p>
+            <a:pPr lvl="1"/>
+            <a:r>
+              <a:rPr lang="en-US" sz="1000" dirty="0"/>
+              <a:t>Recommend creating a free personal organization: </a:t>
+            </a:r>
+            <a:r>
+              <a:rPr lang="en-GB" sz="1000" dirty="0">
+                <a:hlinkClick r:id="rId3"/>
+              </a:rPr>
+              <a:t>https://github.com/organizations/plan</a:t>
+            </a:r>
+            <a:endParaRPr lang="en-GB" sz="1000" dirty="0"/>
+          </a:p>
+          <a:p>
+            <a:pPr marL="228600" lvl="1" indent="0">
+              <a:buNone/>
+            </a:pPr>
+            <a:endParaRPr lang="en-US" sz="1000" dirty="0"/>
+          </a:p>
+          <a:p>
+            <a:r>
+              <a:rPr lang="en-US" sz="1800" dirty="0"/>
+              <a:t>Visual Studio Code</a:t>
+            </a:r>
+          </a:p>
+          <a:p>
+            <a:pPr lvl="1"/>
+            <a:r>
+              <a:rPr lang="en-US" sz="1000" dirty="0"/>
+              <a:t>Download: </a:t>
+            </a:r>
+            <a:r>
+              <a:rPr lang="en-US" sz="1000" dirty="0">
+                <a:hlinkClick r:id="rId4"/>
+              </a:rPr>
+              <a:t>https://code.visualstudio.com/Download</a:t>
+            </a:r>
+            <a:endParaRPr lang="en-US" sz="1000" dirty="0"/>
+          </a:p>
+          <a:p>
+            <a:pPr marL="228600" lvl="1" indent="0">
+              <a:buNone/>
+            </a:pPr>
+            <a:endParaRPr lang="en-US" sz="1000" dirty="0"/>
+          </a:p>
+          <a:p>
+            <a:r>
+              <a:rPr lang="en-US" sz="1800" dirty="0"/>
+              <a:t>git CLI</a:t>
+            </a:r>
+          </a:p>
+          <a:p>
+            <a:pPr lvl="1"/>
+            <a:r>
+              <a:rPr lang="en-US" sz="1000" dirty="0"/>
+              <a:t>Download: </a:t>
+            </a:r>
+            <a:r>
+              <a:rPr lang="en-US" sz="1000" dirty="0">
+                <a:hlinkClick r:id="rId5"/>
+              </a:rPr>
+              <a:t>https://git-scm.com/downloads</a:t>
+            </a:r>
+            <a:endParaRPr lang="en-US" sz="1000" dirty="0"/>
+          </a:p>
+          <a:p>
+            <a:pPr marL="228600" lvl="1" indent="0">
+              <a:buNone/>
+            </a:pPr>
+            <a:endParaRPr lang="en-US" sz="1000" dirty="0"/>
+          </a:p>
+          <a:p>
+            <a:r>
+              <a:rPr lang="en-US" sz="1800" dirty="0"/>
+              <a:t>Azure CLI</a:t>
+            </a:r>
+          </a:p>
+          <a:p>
+            <a:pPr lvl="1"/>
+            <a:r>
+              <a:rPr lang="en-US" sz="1000" dirty="0"/>
+              <a:t>Install: </a:t>
+            </a:r>
+            <a:r>
+              <a:rPr lang="en-US" sz="1000" dirty="0">
+                <a:hlinkClick r:id="rId6"/>
+              </a:rPr>
+              <a:t>https://learn.microsoft.com/en-us/cli/azure/install-azure-cli</a:t>
+            </a:r>
+            <a:endParaRPr lang="en-US" sz="1000" dirty="0"/>
+          </a:p>
+          <a:p>
+            <a:pPr marL="228600" lvl="1" indent="0">
+              <a:buNone/>
+            </a:pPr>
+            <a:endParaRPr lang="en-US" sz="1000" dirty="0"/>
+          </a:p>
+          <a:p>
+            <a:pPr marL="0" indent="0">
+              <a:buNone/>
+            </a:pPr>
+            <a:endParaRPr lang="en-US" sz="1800" dirty="0"/>
+          </a:p>
+        </p:txBody>
+      </p:sp>
+    </p:spTree>
+    <p:extLst>
+      <p:ext uri="{BB962C8B-B14F-4D97-AF65-F5344CB8AC3E}">
+        <p14:creationId xmlns:p14="http://schemas.microsoft.com/office/powerpoint/2010/main" val="93432665"/>
+      </p:ext>
+    </p:extLst>
+  </p:cSld>
+  <p:clrMapOvr>
+    <a:masterClrMapping/>
+  </p:clrMapOvr>
+  <p:transition>
+    <p:fade/>
+  </p:transition>
+</p:sld>
+</file>
+
+<file path=ppt/slides/slide7.xml><?xml version="1.0" encoding="utf-8"?>
+<p:sld xmlns:a="http://schemas.openxmlformats.org/drawingml/2006/main" xmlns:r="http://schemas.openxmlformats.org/officeDocument/2006/relationships" xmlns:p="http://schemas.openxmlformats.org/presentationml/2006/main" show="0">
+  <p:cSld>
+    <p:spTree>
+      <p:nvGrpSpPr>
+        <p:cNvPr id="1" name=""/>
+        <p:cNvGrpSpPr/>
+        <p:nvPr/>
+      </p:nvGrpSpPr>
+      <p:grpSpPr>
+        <a:xfrm>
+          <a:off x="0" y="0"/>
+          <a:ext cx="0" cy="0"/>
+          <a:chOff x="0" y="0"/>
+          <a:chExt cx="0" cy="0"/>
+        </a:xfrm>
+      </p:grpSpPr>
+      <p:sp>
+        <p:nvSpPr>
+          <p:cNvPr id="2" name="Title 1">
+            <a:extLst>
+              <a:ext uri="{FF2B5EF4-FFF2-40B4-BE49-F238E27FC236}">
                 <a16:creationId xmlns:a16="http://schemas.microsoft.com/office/drawing/2014/main" id="{C09E6E73-BF4B-424F-BF86-FF435545D934}"/>
               </a:ext>
             </a:extLst>
@@ -37456,7 +38358,7 @@
 </p:sld>
 </file>
 
-<file path=ppt/slides/slide7.xml><?xml version="1.0" encoding="utf-8"?>
+<file path=ppt/slides/slide8.xml><?xml version="1.0" encoding="utf-8"?>
 <p:sld xmlns:a="http://schemas.openxmlformats.org/drawingml/2006/main" xmlns:r="http://schemas.openxmlformats.org/officeDocument/2006/relationships" xmlns:p="http://schemas.openxmlformats.org/presentationml/2006/main">
   <p:cSld>
     <p:spTree>
@@ -37765,7 +38667,7 @@
 </p:sld>
 </file>
 
-<file path=ppt/slides/slide8.xml><?xml version="1.0" encoding="utf-8"?>
+<file path=ppt/slides/slide9.xml><?xml version="1.0" encoding="utf-8"?>
 <p:sld xmlns:a="http://schemas.openxmlformats.org/drawingml/2006/main" xmlns:r="http://schemas.openxmlformats.org/officeDocument/2006/relationships" xmlns:p="http://schemas.openxmlformats.org/presentationml/2006/main">
   <p:cSld>
     <p:spTree>
@@ -37836,98 +38738,6 @@
     <p:extLst>
       <p:ext uri="{BB962C8B-B14F-4D97-AF65-F5344CB8AC3E}">
         <p14:creationId xmlns:p14="http://schemas.microsoft.com/office/powerpoint/2010/main" val="2559220543"/>
-      </p:ext>
-    </p:extLst>
-  </p:cSld>
-  <p:clrMapOvr>
-    <a:masterClrMapping/>
-  </p:clrMapOvr>
-  <mc:AlternateContent xmlns:mc="http://schemas.openxmlformats.org/markup-compatibility/2006" xmlns:p14="http://schemas.microsoft.com/office/powerpoint/2010/main">
-    <mc:Choice Requires="p14">
-      <p:transition spd="med" p14:dur="700">
-        <p:fade/>
-      </p:transition>
-    </mc:Choice>
-    <mc:Fallback xmlns="">
-      <p:transition spd="med">
-        <p:fade/>
-      </p:transition>
-    </mc:Fallback>
-  </mc:AlternateContent>
-</p:sld>
-</file>
-
-<file path=ppt/slides/slide9.xml><?xml version="1.0" encoding="utf-8"?>
-<p:sld xmlns:a="http://schemas.openxmlformats.org/drawingml/2006/main" xmlns:r="http://schemas.openxmlformats.org/officeDocument/2006/relationships" xmlns:p="http://schemas.openxmlformats.org/presentationml/2006/main">
-  <p:cSld>
-    <p:spTree>
-      <p:nvGrpSpPr>
-        <p:cNvPr id="1" name=""/>
-        <p:cNvGrpSpPr/>
-        <p:nvPr/>
-      </p:nvGrpSpPr>
-      <p:grpSpPr>
-        <a:xfrm>
-          <a:off x="0" y="0"/>
-          <a:ext cx="0" cy="0"/>
-          <a:chOff x="0" y="0"/>
-          <a:chExt cx="0" cy="0"/>
-        </a:xfrm>
-      </p:grpSpPr>
-      <p:sp>
-        <p:nvSpPr>
-          <p:cNvPr id="17" name="Title 16"/>
-          <p:cNvSpPr>
-            <a:spLocks noGrp="1"/>
-          </p:cNvSpPr>
-          <p:nvPr>
-            <p:ph type="title"/>
-          </p:nvPr>
-        </p:nvSpPr>
-        <p:spPr/>
-        <p:txBody>
-          <a:bodyPr/>
-          <a:lstStyle/>
-          <a:p>
-            <a:r>
-              <a:rPr lang="en-US" dirty="0"/>
-              <a:t>Getting hands-on</a:t>
-            </a:r>
-          </a:p>
-        </p:txBody>
-      </p:sp>
-      <p:graphicFrame>
-        <p:nvGraphicFramePr>
-          <p:cNvPr id="3" name="Diagram 2">
-            <a:extLst>
-              <a:ext uri="{FF2B5EF4-FFF2-40B4-BE49-F238E27FC236}">
-                <a16:creationId xmlns:a16="http://schemas.microsoft.com/office/drawing/2014/main" id="{4570497C-3652-49FA-AD68-C673FE6AF973}"/>
-              </a:ext>
-            </a:extLst>
-          </p:cNvPr>
-          <p:cNvGraphicFramePr/>
-          <p:nvPr>
-            <p:extLst>
-              <p:ext uri="{D42A27DB-BD31-4B8C-83A1-F6EECF244321}">
-                <p14:modId xmlns:p14="http://schemas.microsoft.com/office/powerpoint/2010/main" val="1048614019"/>
-              </p:ext>
-            </p:extLst>
-          </p:nvPr>
-        </p:nvGraphicFramePr>
-        <p:xfrm>
-          <a:off x="588262" y="1452979"/>
-          <a:ext cx="11314435" cy="3939540"/>
-        </p:xfrm>
-        <a:graphic>
-          <a:graphicData uri="http://schemas.openxmlformats.org/drawingml/2006/diagram">
-            <dgm:relIds xmlns:dgm="http://schemas.openxmlformats.org/drawingml/2006/diagram" xmlns:r="http://schemas.openxmlformats.org/officeDocument/2006/relationships" r:dm="rId3" r:lo="rId4" r:qs="rId5" r:cs="rId6"/>
-          </a:graphicData>
-        </a:graphic>
-      </p:graphicFrame>
-    </p:spTree>
-    <p:extLst>
-      <p:ext uri="{BB962C8B-B14F-4D97-AF65-F5344CB8AC3E}">
-        <p14:creationId xmlns:p14="http://schemas.microsoft.com/office/powerpoint/2010/main" val="1391954703"/>
       </p:ext>
     </p:extLst>
   </p:cSld>

</xml_diff>

<commit_message>
Update CD demo and add clarity to slides
</commit_message>
<xml_diff>
--- a/PPTs/00_Workshop_Introduction.pptx
+++ b/PPTs/00_Workshop_Introduction.pptx
@@ -23137,7 +23137,7 @@
               <a:rPr lang="en-US" smtClean="0">
                 <a:latin typeface="Segoe UI" pitchFamily="34" charset="0"/>
               </a:rPr>
-              <a:t>1/4/2023 8:39 AM</a:t>
+              <a:t>5/16/2023 9:11 AM</a:t>
             </a:fld>
             <a:endParaRPr lang="en-US" dirty="0">
               <a:latin typeface="Segoe UI" pitchFamily="34" charset="0"/>
@@ -23415,7 +23415,7 @@
           <a:p>
             <a:fld id="{386CE63F-9E7F-4C04-9D0D-FCA25A8E9E86}" type="datetime8">
               <a:rPr lang="en-US" smtClean="0"/>
-              <a:t>1/4/2023 8:39 AM</a:t>
+              <a:t>5/16/2023 9:11 AM</a:t>
             </a:fld>
             <a:endParaRPr lang="en-US" dirty="0"/>
           </a:p>
@@ -23828,7 +23828,7 @@
                   <a:prstClr val="black"/>
                 </a:solidFill>
               </a:rPr>
-              <a:t>1/4/2023 8:39 AM</a:t>
+              <a:t>5/16/2023 9:11 AM</a:t>
             </a:fld>
             <a:endParaRPr lang="en-US" dirty="0">
               <a:solidFill>
@@ -24265,7 +24265,7 @@
           <a:p>
             <a:fld id="{386CE63F-9E7F-4C04-9D0D-FCA25A8E9E86}" type="datetime8">
               <a:rPr lang="en-US" smtClean="0"/>
-              <a:t>1/4/2023 8:39 AM</a:t>
+              <a:t>5/16/2023 9:11 AM</a:t>
             </a:fld>
             <a:endParaRPr lang="en-US" dirty="0"/>
           </a:p>
@@ -24472,7 +24472,7 @@
           <a:p>
             <a:fld id="{386CE63F-9E7F-4C04-9D0D-FCA25A8E9E86}" type="datetime8">
               <a:rPr lang="en-US" smtClean="0"/>
-              <a:t>1/4/2023 8:39 AM</a:t>
+              <a:t>5/16/2023 9:11 AM</a:t>
             </a:fld>
             <a:endParaRPr lang="en-US" dirty="0"/>
           </a:p>
@@ -24653,7 +24653,7 @@
           <a:p>
             <a:fld id="{386CE63F-9E7F-4C04-9D0D-FCA25A8E9E86}" type="datetime8">
               <a:rPr lang="en-US" smtClean="0"/>
-              <a:t>1/4/2023 8:39 AM</a:t>
+              <a:t>5/16/2023 9:11 AM</a:t>
             </a:fld>
             <a:endParaRPr lang="en-US" dirty="0"/>
           </a:p>
@@ -24838,7 +24838,7 @@
           <a:p>
             <a:fld id="{386CE63F-9E7F-4C04-9D0D-FCA25A8E9E86}" type="datetime8">
               <a:rPr lang="en-US" smtClean="0"/>
-              <a:t>1/4/2023 8:39 AM</a:t>
+              <a:t>5/16/2023 9:11 AM</a:t>
             </a:fld>
             <a:endParaRPr lang="en-US" dirty="0"/>
           </a:p>
@@ -25018,7 +25018,7 @@
           <a:p>
             <a:fld id="{72E0C910-0166-48E0-B8EF-5071277A02A8}" type="datetime8">
               <a:rPr lang="en-US" smtClean="0"/>
-              <a:t>1/4/2023 8:39 AM</a:t>
+              <a:t>5/16/2023 9:11 AM</a:t>
             </a:fld>
             <a:endParaRPr lang="en-US" dirty="0"/>
           </a:p>
@@ -25198,7 +25198,7 @@
           <a:p>
             <a:fld id="{72E0C910-0166-48E0-B8EF-5071277A02A8}" type="datetime8">
               <a:rPr lang="en-US" smtClean="0"/>
-              <a:t>1/4/2023 8:39 AM</a:t>
+              <a:t>5/16/2023 9:11 AM</a:t>
             </a:fld>
             <a:endParaRPr lang="en-US" dirty="0"/>
           </a:p>
@@ -25363,7 +25363,7 @@
           <a:p>
             <a:fld id="{9427A7F7-BB1E-479D-AFAA-B52F4D0C99F2}" type="datetime8">
               <a:rPr lang="en-US" smtClean="0"/>
-              <a:t>1/4/2023 8:39 AM</a:t>
+              <a:t>5/16/2023 9:11 AM</a:t>
             </a:fld>
             <a:endParaRPr lang="en-US" dirty="0"/>
           </a:p>
@@ -36457,7 +36457,10 @@
           <a:bodyPr/>
           <a:lstStyle/>
           <a:p>
-            <a:endParaRPr lang="en-GB"/>
+            <a:r>
+              <a:rPr lang="en-GB" dirty="0"/>
+              <a:t>Jared Holgate</a:t>
+            </a:r>
           </a:p>
         </p:txBody>
       </p:sp>
@@ -39599,12 +39602,18 @@
 </file>
 
 <file path=customXml/item1.xml><?xml version="1.0" encoding="utf-8"?>
-<?mso-contentType ?>
-<FormTemplates xmlns="http://schemas.microsoft.com/sharepoint/v3/contenttype/forms">
-  <Display>DocumentLibraryForm</Display>
-  <Edit>DocumentLibraryForm</Edit>
-  <New>DocumentLibraryForm</New>
-</FormTemplates>
+<p:properties xmlns:p="http://schemas.microsoft.com/office/2006/metadata/properties" xmlns:pc="http://schemas.microsoft.com/office/infopath/2007/PartnerControls" xmlns:xsi="http://www.w3.org/2001/XMLSchema-instance">
+  <documentManagement>
+    <SharedWithUsers xmlns="53207a91-4873-4278-88cd-3a5c1985bff7">
+      <UserInfo>
+        <DisplayName/>
+        <AccountId xsi:nil="true"/>
+        <AccountType/>
+      </UserInfo>
+    </SharedWithUsers>
+    <SharedWithDetails xmlns="53207a91-4873-4278-88cd-3a5c1985bff7" xsi:nil="true"/>
+  </documentManagement>
+</p:properties>
 </file>
 
 <file path=customXml/item2.xml><?xml version="1.0" encoding="utf-8"?>
@@ -39831,24 +39840,20 @@
 </file>
 
 <file path=customXml/item3.xml><?xml version="1.0" encoding="utf-8"?>
-<p:properties xmlns:p="http://schemas.microsoft.com/office/2006/metadata/properties" xmlns:pc="http://schemas.microsoft.com/office/infopath/2007/PartnerControls" xmlns:xsi="http://www.w3.org/2001/XMLSchema-instance">
-  <documentManagement>
-    <SharedWithUsers xmlns="53207a91-4873-4278-88cd-3a5c1985bff7">
-      <UserInfo>
-        <DisplayName/>
-        <AccountId xsi:nil="true"/>
-        <AccountType/>
-      </UserInfo>
-    </SharedWithUsers>
-    <SharedWithDetails xmlns="53207a91-4873-4278-88cd-3a5c1985bff7" xsi:nil="true"/>
-  </documentManagement>
-</p:properties>
+<?mso-contentType ?>
+<FormTemplates xmlns="http://schemas.microsoft.com/sharepoint/v3/contenttype/forms">
+  <Display>DocumentLibraryForm</Display>
+  <Edit>DocumentLibraryForm</Edit>
+  <New>DocumentLibraryForm</New>
+</FormTemplates>
 </file>
 
 <file path=customXml/itemProps1.xml><?xml version="1.0" encoding="utf-8"?>
-<ds:datastoreItem xmlns:ds="http://schemas.openxmlformats.org/officeDocument/2006/customXml" ds:itemID="{758FDAC0-319D-4A54-8D8E-1D42CB1F8004}">
+<ds:datastoreItem xmlns:ds="http://schemas.openxmlformats.org/officeDocument/2006/customXml" ds:itemID="{F990F116-B58F-4255-B05B-DA3808E0E5C6}">
   <ds:schemaRefs>
-    <ds:schemaRef ds:uri="http://schemas.microsoft.com/sharepoint/v3/contenttype/forms"/>
+    <ds:schemaRef ds:uri="http://schemas.microsoft.com/office/2006/metadata/properties"/>
+    <ds:schemaRef ds:uri="http://schemas.microsoft.com/office/infopath/2007/PartnerControls"/>
+    <ds:schemaRef ds:uri="53207a91-4873-4278-88cd-3a5c1985bff7"/>
   </ds:schemaRefs>
 </ds:datastoreItem>
 </file>
@@ -39873,11 +39878,9 @@
 </file>
 
 <file path=customXml/itemProps3.xml><?xml version="1.0" encoding="utf-8"?>
-<ds:datastoreItem xmlns:ds="http://schemas.openxmlformats.org/officeDocument/2006/customXml" ds:itemID="{F990F116-B58F-4255-B05B-DA3808E0E5C6}">
+<ds:datastoreItem xmlns:ds="http://schemas.openxmlformats.org/officeDocument/2006/customXml" ds:itemID="{758FDAC0-319D-4A54-8D8E-1D42CB1F8004}">
   <ds:schemaRefs>
-    <ds:schemaRef ds:uri="http://schemas.microsoft.com/office/2006/metadata/properties"/>
-    <ds:schemaRef ds:uri="http://schemas.microsoft.com/office/infopath/2007/PartnerControls"/>
-    <ds:schemaRef ds:uri="53207a91-4873-4278-88cd-3a5c1985bff7"/>
+    <ds:schemaRef ds:uri="http://schemas.microsoft.com/sharepoint/v3/contenttype/forms"/>
   </ds:schemaRefs>
 </ds:datastoreItem>
 </file>

</xml_diff>

<commit_message>
Personal Details for Workshop Intro
</commit_message>
<xml_diff>
--- a/PPTs/00_Workshop_Introduction.pptx
+++ b/PPTs/00_Workshop_Introduction.pptx
@@ -7553,43 +7553,6 @@
         </a:p>
       </dgm:t>
     </dgm:pt>
-    <dgm:pt modelId="{20370497-7CCE-4822-8EA3-37D67CC7EA3A}">
-      <dgm:prSet/>
-      <dgm:spPr/>
-      <dgm:t>
-        <a:bodyPr/>
-        <a:lstStyle/>
-        <a:p>
-          <a:r>
-            <a:rPr lang="en-US" baseline="0" dirty="0"/>
-            <a:t>Infrastructure / DevOps / Software Engineering / Architect</a:t>
-          </a:r>
-          <a:endParaRPr lang="en-US" dirty="0"/>
-        </a:p>
-      </dgm:t>
-    </dgm:pt>
-    <dgm:pt modelId="{3FE0BD4D-4505-44C6-8715-92EF451E34FA}" type="parTrans" cxnId="{E0C466B2-BEFD-4353-96DC-E8AB174AFD49}">
-      <dgm:prSet/>
-      <dgm:spPr/>
-      <dgm:t>
-        <a:bodyPr/>
-        <a:lstStyle/>
-        <a:p>
-          <a:endParaRPr lang="en-US"/>
-        </a:p>
-      </dgm:t>
-    </dgm:pt>
-    <dgm:pt modelId="{E8A94CAA-852B-48AA-9AE5-31D55768CF73}" type="sibTrans" cxnId="{E0C466B2-BEFD-4353-96DC-E8AB174AFD49}">
-      <dgm:prSet/>
-      <dgm:spPr/>
-      <dgm:t>
-        <a:bodyPr/>
-        <a:lstStyle/>
-        <a:p>
-          <a:endParaRPr lang="en-US"/>
-        </a:p>
-      </dgm:t>
-    </dgm:pt>
     <dgm:pt modelId="{83FECE75-8A37-4864-82AD-9CE8FDAC438E}">
       <dgm:prSet/>
       <dgm:spPr/>
@@ -7599,7 +7562,11 @@
         <a:p>
           <a:r>
             <a:rPr lang="en-GB" dirty="0"/>
-            <a:t>Prior experience with IAC (ARM, Terraform or any other)</a:t>
+            <a:t>Programming/Scripting Experience: Python, Ruby, Bash and </a:t>
+          </a:r>
+          <a:r>
+            <a:rPr lang="en-GB" dirty="0" err="1"/>
+            <a:t>Powershell</a:t>
           </a:r>
           <a:endParaRPr lang="en-US" dirty="0"/>
         </a:p>
@@ -7627,43 +7594,6 @@
         </a:p>
       </dgm:t>
     </dgm:pt>
-    <dgm:pt modelId="{B761BCAD-EF07-4488-B549-55BD4CFF8321}">
-      <dgm:prSet/>
-      <dgm:spPr/>
-      <dgm:t>
-        <a:bodyPr/>
-        <a:lstStyle/>
-        <a:p>
-          <a:r>
-            <a:rPr lang="en-GB"/>
-            <a:t>Prior programming or scripting experience</a:t>
-          </a:r>
-          <a:endParaRPr lang="en-US"/>
-        </a:p>
-      </dgm:t>
-    </dgm:pt>
-    <dgm:pt modelId="{955FCBBD-D372-439C-9737-9DB9E95CBEC0}" type="parTrans" cxnId="{F3C8B566-D413-499C-BA49-3F0DA2FA01EF}">
-      <dgm:prSet/>
-      <dgm:spPr/>
-      <dgm:t>
-        <a:bodyPr/>
-        <a:lstStyle/>
-        <a:p>
-          <a:endParaRPr lang="en-US"/>
-        </a:p>
-      </dgm:t>
-    </dgm:pt>
-    <dgm:pt modelId="{3BF09059-BD4D-4204-8558-FF1AE47CCC64}" type="sibTrans" cxnId="{F3C8B566-D413-499C-BA49-3F0DA2FA01EF}">
-      <dgm:prSet/>
-      <dgm:spPr/>
-      <dgm:t>
-        <a:bodyPr/>
-        <a:lstStyle/>
-        <a:p>
-          <a:endParaRPr lang="en-US"/>
-        </a:p>
-      </dgm:t>
-    </dgm:pt>
     <dgm:pt modelId="{E570BEE0-BC65-477A-9898-844DEAA96D36}">
       <dgm:prSet/>
       <dgm:spPr/>
@@ -7672,10 +7602,10 @@
         <a:lstStyle/>
         <a:p>
           <a:r>
-            <a:rPr lang="en-GB"/>
-            <a:t>Experience in Azure (or any other cloud vendor)</a:t>
+            <a:rPr lang="en-GB" dirty="0"/>
+            <a:t>Experience building solutions in Azure, AWS, GCP and On-Prem</a:t>
           </a:r>
-          <a:endParaRPr lang="en-US"/>
+          <a:endParaRPr lang="en-US" dirty="0"/>
         </a:p>
       </dgm:t>
     </dgm:pt>
@@ -7709,8 +7639,8 @@
         <a:lstStyle/>
         <a:p>
           <a:r>
-            <a:rPr lang="en-US"/>
-            <a:t>Prior experience in using Containers-as-Infrastructure</a:t>
+            <a:rPr lang="en-US" dirty="0"/>
+            <a:t>Prior experience in Kubernetes and Docker</a:t>
           </a:r>
         </a:p>
       </dgm:t>
@@ -7764,6 +7694,91 @@
       </dgm:t>
     </dgm:pt>
     <dgm:pt modelId="{BCDE15AB-CCC5-4BFA-A2CD-8293872703F6}" type="sibTrans" cxnId="{879F4BD8-57DB-4130-A4EF-1C15723905A8}">
+      <dgm:prSet/>
+      <dgm:spPr/>
+      <dgm:t>
+        <a:bodyPr/>
+        <a:lstStyle/>
+        <a:p>
+          <a:endParaRPr lang="en-US"/>
+        </a:p>
+      </dgm:t>
+    </dgm:pt>
+    <dgm:pt modelId="{50B6D4E2-419A-428F-8998-1BD432AC4766}">
+      <dgm:prSet/>
+      <dgm:spPr/>
+      <dgm:t>
+        <a:bodyPr/>
+        <a:lstStyle/>
+        <a:p>
+          <a:r>
+            <a:rPr lang="en-US" dirty="0"/>
+            <a:t>Cloud Solutions Architect - </a:t>
+          </a:r>
+          <a:r>
+            <a:rPr lang="en-US" baseline="0" dirty="0"/>
+            <a:t>Infrastructure / DevOps / IT Architecture</a:t>
+          </a:r>
+          <a:endParaRPr lang="en-US" dirty="0"/>
+        </a:p>
+      </dgm:t>
+    </dgm:pt>
+    <dgm:pt modelId="{966ABAF5-805E-4487-8E11-2993C35BE0E0}" type="parTrans" cxnId="{3B9FD9E3-D38C-4634-B7F8-8455EB6464D4}">
+      <dgm:prSet/>
+      <dgm:spPr/>
+      <dgm:t>
+        <a:bodyPr/>
+        <a:lstStyle/>
+        <a:p>
+          <a:endParaRPr lang="en-US"/>
+        </a:p>
+      </dgm:t>
+    </dgm:pt>
+    <dgm:pt modelId="{ABE5E0B2-15C4-4BD3-8B43-F2F68D412340}" type="sibTrans" cxnId="{3B9FD9E3-D38C-4634-B7F8-8455EB6464D4}">
+      <dgm:prSet/>
+      <dgm:spPr/>
+      <dgm:t>
+        <a:bodyPr/>
+        <a:lstStyle/>
+        <a:p>
+          <a:endParaRPr lang="en-US"/>
+        </a:p>
+      </dgm:t>
+    </dgm:pt>
+    <dgm:pt modelId="{0E46E09A-A1B4-4829-A0C1-BDB5E1CDAA7A}">
+      <dgm:prSet/>
+      <dgm:spPr/>
+      <dgm:t>
+        <a:bodyPr/>
+        <a:lstStyle/>
+        <a:p>
+          <a:r>
+            <a:rPr lang="en-US" dirty="0"/>
+            <a:t>IAC Experience: Terraform, ARM, </a:t>
+          </a:r>
+          <a:r>
+            <a:rPr lang="en-US" dirty="0" err="1"/>
+            <a:t>CloudFormations</a:t>
+          </a:r>
+          <a:r>
+            <a:rPr lang="en-US" dirty="0"/>
+            <a:t>, Puppet, Ansible, Chef, CI/CD</a:t>
+          </a:r>
+        </a:p>
+      </dgm:t>
+    </dgm:pt>
+    <dgm:pt modelId="{71C9914F-1B6D-4F9C-AF06-8B14FCD65D1A}" type="parTrans" cxnId="{9D01CEB6-AA42-4BBD-9D8A-4ED6BD015A9C}">
+      <dgm:prSet/>
+      <dgm:spPr/>
+      <dgm:t>
+        <a:bodyPr/>
+        <a:lstStyle/>
+        <a:p>
+          <a:endParaRPr lang="en-US"/>
+        </a:p>
+      </dgm:t>
+    </dgm:pt>
+    <dgm:pt modelId="{2029B8B7-5A85-4EAE-9B20-C0950D094B73}" type="sibTrans" cxnId="{9D01CEB6-AA42-4BBD-9D8A-4ED6BD015A9C}">
       <dgm:prSet/>
       <dgm:spPr/>
       <dgm:t>
@@ -7881,7 +7896,8 @@
     </dgm:pt>
   </dgm:ptLst>
   <dgm:cxnLst>
-    <dgm:cxn modelId="{980FA203-DEEA-4511-ADDE-CC56E2F042C9}" srcId="{E8CEC1CB-6C36-4B7B-8401-1970C20C333F}" destId="{83FECE75-8A37-4864-82AD-9CE8FDAC438E}" srcOrd="1" destOrd="0" parTransId="{5D46DEFB-A922-48B5-A01B-04B1CD36E04F}" sibTransId="{C40371DE-63AC-4452-9AB8-5E2E17C11EEC}"/>
+    <dgm:cxn modelId="{980FA203-DEEA-4511-ADDE-CC56E2F042C9}" srcId="{E8CEC1CB-6C36-4B7B-8401-1970C20C333F}" destId="{83FECE75-8A37-4864-82AD-9CE8FDAC438E}" srcOrd="2" destOrd="0" parTransId="{5D46DEFB-A922-48B5-A01B-04B1CD36E04F}" sibTransId="{C40371DE-63AC-4452-9AB8-5E2E17C11EEC}"/>
+    <dgm:cxn modelId="{9D8D1906-48C2-4D50-A86A-EFD7013ACA05}" type="presOf" srcId="{0E46E09A-A1B4-4829-A0C1-BDB5E1CDAA7A}" destId="{5EE5BA11-48E3-49A7-94B5-DB8B3377CAD0}" srcOrd="0" destOrd="1" presId="urn:microsoft.com/office/officeart/2005/8/layout/list1"/>
     <dgm:cxn modelId="{D9275911-9F79-44F1-BD6F-579BDA89F0F2}" type="presOf" srcId="{E570BEE0-BC65-477A-9898-844DEAA96D36}" destId="{5EE5BA11-48E3-49A7-94B5-DB8B3377CAD0}" srcOrd="0" destOrd="3" presId="urn:microsoft.com/office/officeart/2005/8/layout/list1"/>
     <dgm:cxn modelId="{33116115-A14C-46CE-9439-A4F4AC5EF4EE}" type="presOf" srcId="{E8CEC1CB-6C36-4B7B-8401-1970C20C333F}" destId="{4D4B07DB-2B3B-48CC-9150-8437B717DBE4}" srcOrd="1" destOrd="0" presId="urn:microsoft.com/office/officeart/2005/8/layout/list1"/>
     <dgm:cxn modelId="{0139B41A-C80B-4385-B6FA-2195966C234A}" type="presOf" srcId="{B37CB253-82C7-4C98-AB47-8E85EE10DA78}" destId="{1DE83800-64BC-4B64-BA6C-40F06764C1FA}" srcOrd="0" destOrd="0" presId="urn:microsoft.com/office/officeart/2005/8/layout/list1"/>
@@ -7890,17 +7906,16 @@
     <dgm:cxn modelId="{76A4BF2E-EF2B-4E16-8259-14E4A17F25BE}" type="presOf" srcId="{5D2D5B1F-6BD7-4141-9ACF-97A491094E6F}" destId="{8870D68C-5D4C-46DA-904B-62B863208EDF}" srcOrd="1" destOrd="0" presId="urn:microsoft.com/office/officeart/2005/8/layout/list1"/>
     <dgm:cxn modelId="{EC7C2531-19FC-472B-90A3-EF85CC45988A}" srcId="{E8CEC1CB-6C36-4B7B-8401-1970C20C333F}" destId="{241322C3-A8F2-4693-A592-2FF51FE2061F}" srcOrd="4" destOrd="0" parTransId="{84441BE6-24E9-44DC-AB03-E49814E3F3A7}" sibTransId="{41F2AFD7-2535-47DD-B40C-F30ED928BE40}"/>
     <dgm:cxn modelId="{6532FA5F-3A12-4C38-833D-4B2B59398146}" type="presOf" srcId="{5D2D5B1F-6BD7-4141-9ACF-97A491094E6F}" destId="{7E698FDA-C5B7-43A2-B636-3E7AC587E465}" srcOrd="0" destOrd="0" presId="urn:microsoft.com/office/officeart/2005/8/layout/list1"/>
-    <dgm:cxn modelId="{F3C8B566-D413-499C-BA49-3F0DA2FA01EF}" srcId="{E8CEC1CB-6C36-4B7B-8401-1970C20C333F}" destId="{B761BCAD-EF07-4488-B549-55BD4CFF8321}" srcOrd="2" destOrd="0" parTransId="{955FCBBD-D372-439C-9737-9DB9E95CBEC0}" sibTransId="{3BF09059-BD4D-4204-8558-FF1AE47CCC64}"/>
-    <dgm:cxn modelId="{D9920C6D-DC68-4845-AB8E-90856DBC2273}" type="presOf" srcId="{83FECE75-8A37-4864-82AD-9CE8FDAC438E}" destId="{5EE5BA11-48E3-49A7-94B5-DB8B3377CAD0}" srcOrd="0" destOrd="1" presId="urn:microsoft.com/office/officeart/2005/8/layout/list1"/>
-    <dgm:cxn modelId="{E0C466B2-BEFD-4353-96DC-E8AB174AFD49}" srcId="{E8CEC1CB-6C36-4B7B-8401-1970C20C333F}" destId="{20370497-7CCE-4822-8EA3-37D67CC7EA3A}" srcOrd="0" destOrd="0" parTransId="{3FE0BD4D-4505-44C6-8715-92EF451E34FA}" sibTransId="{E8A94CAA-852B-48AA-9AE5-31D55768CF73}"/>
+    <dgm:cxn modelId="{D9920C6D-DC68-4845-AB8E-90856DBC2273}" type="presOf" srcId="{83FECE75-8A37-4864-82AD-9CE8FDAC438E}" destId="{5EE5BA11-48E3-49A7-94B5-DB8B3377CAD0}" srcOrd="0" destOrd="2" presId="urn:microsoft.com/office/officeart/2005/8/layout/list1"/>
+    <dgm:cxn modelId="{D54CBFA6-27F0-41C6-8CAF-24C6A4D0CA19}" type="presOf" srcId="{50B6D4E2-419A-428F-8998-1BD432AC4766}" destId="{5EE5BA11-48E3-49A7-94B5-DB8B3377CAD0}" srcOrd="0" destOrd="0" presId="urn:microsoft.com/office/officeart/2005/8/layout/list1"/>
+    <dgm:cxn modelId="{9D01CEB6-AA42-4BBD-9D8A-4ED6BD015A9C}" srcId="{E8CEC1CB-6C36-4B7B-8401-1970C20C333F}" destId="{0E46E09A-A1B4-4829-A0C1-BDB5E1CDAA7A}" srcOrd="1" destOrd="0" parTransId="{71C9914F-1B6D-4F9C-AF06-8B14FCD65D1A}" sibTransId="{2029B8B7-5A85-4EAE-9B20-C0950D094B73}"/>
     <dgm:cxn modelId="{883709B9-7054-41DA-835B-8242B79E61CB}" type="presOf" srcId="{63207730-59E8-4F1A-BA18-D6048F6935F2}" destId="{0267D652-8413-47D3-A23D-7EF2A74D3A48}" srcOrd="1" destOrd="0" presId="urn:microsoft.com/office/officeart/2005/8/layout/list1"/>
     <dgm:cxn modelId="{671E80BA-D2E6-4E87-A1F5-5F8CF7DBC89F}" srcId="{B37CB253-82C7-4C98-AB47-8E85EE10DA78}" destId="{63207730-59E8-4F1A-BA18-D6048F6935F2}" srcOrd="0" destOrd="0" parTransId="{FDD69EBF-1D4A-45F1-8BB0-3E66807D9E6C}" sibTransId="{C01048BE-6AE5-4AC0-B2E3-F37CFE7AB5C7}"/>
     <dgm:cxn modelId="{9EA562BF-6405-4DF3-8B3F-62A8569AF000}" srcId="{B37CB253-82C7-4C98-AB47-8E85EE10DA78}" destId="{E8CEC1CB-6C36-4B7B-8401-1970C20C333F}" srcOrd="1" destOrd="0" parTransId="{1894AD07-7C87-48EF-BB54-AD52FED20054}" sibTransId="{B0710BF1-A1FB-47A7-B626-F0B516FDF872}"/>
     <dgm:cxn modelId="{59BF96C0-FC93-4E53-B681-D441B130CCEA}" type="presOf" srcId="{63207730-59E8-4F1A-BA18-D6048F6935F2}" destId="{5E454CCA-9636-40BD-92AB-AB01B0537B89}" srcOrd="0" destOrd="0" presId="urn:microsoft.com/office/officeart/2005/8/layout/list1"/>
     <dgm:cxn modelId="{51A99BC0-10EE-4045-BC83-019EF8F9F413}" srcId="{E8CEC1CB-6C36-4B7B-8401-1970C20C333F}" destId="{E570BEE0-BC65-477A-9898-844DEAA96D36}" srcOrd="3" destOrd="0" parTransId="{7864300B-3B17-43B2-98B1-E44CA06C0D88}" sibTransId="{4FF152D6-AB72-49D5-BC88-C4AD4AAF7A7B}"/>
-    <dgm:cxn modelId="{5B6E10C3-F1E7-4752-AAB7-FF069685DBCF}" type="presOf" srcId="{20370497-7CCE-4822-8EA3-37D67CC7EA3A}" destId="{5EE5BA11-48E3-49A7-94B5-DB8B3377CAD0}" srcOrd="0" destOrd="0" presId="urn:microsoft.com/office/officeart/2005/8/layout/list1"/>
-    <dgm:cxn modelId="{71B7E0D2-9EA5-4B02-9E34-B45466AC7A8F}" type="presOf" srcId="{B761BCAD-EF07-4488-B549-55BD4CFF8321}" destId="{5EE5BA11-48E3-49A7-94B5-DB8B3377CAD0}" srcOrd="0" destOrd="2" presId="urn:microsoft.com/office/officeart/2005/8/layout/list1"/>
     <dgm:cxn modelId="{879F4BD8-57DB-4130-A4EF-1C15723905A8}" srcId="{B37CB253-82C7-4C98-AB47-8E85EE10DA78}" destId="{5D2D5B1F-6BD7-4141-9ACF-97A491094E6F}" srcOrd="2" destOrd="0" parTransId="{2998F6C1-75AA-4CA9-AB2B-FD48929247C7}" sibTransId="{BCDE15AB-CCC5-4BFA-A2CD-8293872703F6}"/>
+    <dgm:cxn modelId="{3B9FD9E3-D38C-4634-B7F8-8455EB6464D4}" srcId="{E8CEC1CB-6C36-4B7B-8401-1970C20C333F}" destId="{50B6D4E2-419A-428F-8998-1BD432AC4766}" srcOrd="0" destOrd="0" parTransId="{966ABAF5-805E-4487-8E11-2993C35BE0E0}" sibTransId="{ABE5E0B2-15C4-4BD3-8B43-F2F68D412340}"/>
     <dgm:cxn modelId="{2760EA0D-4E04-4D05-B189-CF9553C80BC3}" type="presParOf" srcId="{1DE83800-64BC-4B64-BA6C-40F06764C1FA}" destId="{0216353A-C516-4C83-9674-9755D2D8D45E}" srcOrd="0" destOrd="0" presId="urn:microsoft.com/office/officeart/2005/8/layout/list1"/>
     <dgm:cxn modelId="{26096998-D290-4050-B672-9A4FCE4B417C}" type="presParOf" srcId="{0216353A-C516-4C83-9674-9755D2D8D45E}" destId="{5E454CCA-9636-40BD-92AB-AB01B0537B89}" srcOrd="0" destOrd="0" presId="urn:microsoft.com/office/officeart/2005/8/layout/list1"/>
     <dgm:cxn modelId="{EB97C491-0D60-45C0-918D-C6DC9AEEBA84}" type="presParOf" srcId="{0216353A-C516-4C83-9674-9755D2D8D45E}" destId="{0267D652-8413-47D3-A23D-7EF2A74D3A48}" srcOrd="1" destOrd="0" presId="urn:microsoft.com/office/officeart/2005/8/layout/list1"/>
@@ -10592,8 +10607,8 @@
       </dsp:nvSpPr>
       <dsp:spPr>
         <a:xfrm>
-          <a:off x="0" y="395613"/>
-          <a:ext cx="11018837" cy="529200"/>
+          <a:off x="0" y="491868"/>
+          <a:ext cx="11018837" cy="504000"/>
         </a:xfrm>
         <a:prstGeom prst="rect">
           <a:avLst/>
@@ -10640,8 +10655,8 @@
       </dsp:nvSpPr>
       <dsp:spPr>
         <a:xfrm>
-          <a:off x="550941" y="85653"/>
-          <a:ext cx="7713186" cy="619920"/>
+          <a:off x="550941" y="196668"/>
+          <a:ext cx="7713186" cy="590400"/>
         </a:xfrm>
         <a:prstGeom prst="roundRect">
           <a:avLst/>
@@ -10687,7 +10702,7 @@
         </a:bodyPr>
         <a:lstStyle/>
         <a:p>
-          <a:pPr marL="0" lvl="0" indent="0" algn="l" defTabSz="933450">
+          <a:pPr marL="0" lvl="0" indent="0" algn="l" defTabSz="889000">
             <a:lnSpc>
               <a:spcPct val="90000"/>
             </a:lnSpc>
@@ -10700,14 +10715,14 @@
             <a:buNone/>
           </a:pPr>
           <a:r>
-            <a:rPr lang="en-US" sz="2100" kern="1200"/>
+            <a:rPr lang="en-US" sz="2000" kern="1200"/>
             <a:t>About you</a:t>
           </a:r>
         </a:p>
       </dsp:txBody>
       <dsp:txXfrm>
-        <a:off x="581203" y="115915"/>
-        <a:ext cx="7652662" cy="559396"/>
+        <a:off x="579762" y="225489"/>
+        <a:ext cx="7655544" cy="532758"/>
       </dsp:txXfrm>
     </dsp:sp>
     <dsp:sp modelId="{5EE5BA11-48E3-49A7-94B5-DB8B3377CAD0}">
@@ -10717,8 +10732,8 @@
       </dsp:nvSpPr>
       <dsp:spPr>
         <a:xfrm>
-          <a:off x="0" y="1348174"/>
-          <a:ext cx="11018837" cy="2447550"/>
+          <a:off x="0" y="1399068"/>
+          <a:ext cx="11018837" cy="2331000"/>
         </a:xfrm>
         <a:prstGeom prst="rect">
           <a:avLst/>
@@ -10758,12 +10773,12 @@
         <a:fontRef idx="minor"/>
       </dsp:style>
       <dsp:txBody>
-        <a:bodyPr spcFirstLastPara="0" vert="horz" wrap="square" lIns="855184" tIns="437388" rIns="855184" bIns="149352" numCol="1" spcCol="1270" anchor="t" anchorCtr="0">
+        <a:bodyPr spcFirstLastPara="0" vert="horz" wrap="square" lIns="855184" tIns="416560" rIns="855184" bIns="142240" numCol="1" spcCol="1270" anchor="t" anchorCtr="0">
           <a:noAutofit/>
         </a:bodyPr>
         <a:lstStyle/>
         <a:p>
-          <a:pPr marL="228600" lvl="1" indent="-228600" algn="l" defTabSz="933450">
+          <a:pPr marL="228600" lvl="1" indent="-228600" algn="l" defTabSz="889000">
             <a:lnSpc>
               <a:spcPct val="90000"/>
             </a:lnSpc>
@@ -10776,13 +10791,17 @@
             <a:buChar char="•"/>
           </a:pPr>
           <a:r>
-            <a:rPr lang="en-US" sz="2100" kern="1200" baseline="0" dirty="0"/>
-            <a:t>Infrastructure / DevOps / Software Engineering / Architect</a:t>
+            <a:rPr lang="en-US" sz="2000" kern="1200" dirty="0"/>
+            <a:t>Cloud Solutions Architect - </a:t>
           </a:r>
-          <a:endParaRPr lang="en-US" sz="2100" kern="1200" dirty="0"/>
+          <a:r>
+            <a:rPr lang="en-US" sz="2000" kern="1200" baseline="0" dirty="0"/>
+            <a:t>Infrastructure / DevOps / IT Architecture</a:t>
+          </a:r>
+          <a:endParaRPr lang="en-US" sz="2000" kern="1200" dirty="0"/>
         </a:p>
         <a:p>
-          <a:pPr marL="228600" lvl="1" indent="-228600" algn="l" defTabSz="933450">
+          <a:pPr marL="228600" lvl="1" indent="-228600" algn="l" defTabSz="889000">
             <a:lnSpc>
               <a:spcPct val="90000"/>
             </a:lnSpc>
@@ -10795,13 +10814,20 @@
             <a:buChar char="•"/>
           </a:pPr>
           <a:r>
-            <a:rPr lang="en-GB" sz="2100" kern="1200" dirty="0"/>
-            <a:t>Prior experience with IAC (ARM, Terraform or any other)</a:t>
+            <a:rPr lang="en-US" sz="2000" kern="1200" dirty="0"/>
+            <a:t>IAC Experience: Terraform, ARM, </a:t>
           </a:r>
-          <a:endParaRPr lang="en-US" sz="2100" kern="1200" dirty="0"/>
+          <a:r>
+            <a:rPr lang="en-US" sz="2000" kern="1200" dirty="0" err="1"/>
+            <a:t>CloudFormations</a:t>
+          </a:r>
+          <a:r>
+            <a:rPr lang="en-US" sz="2000" kern="1200" dirty="0"/>
+            <a:t>, Puppet, Ansible, Chef, CI/CD</a:t>
+          </a:r>
         </a:p>
         <a:p>
-          <a:pPr marL="228600" lvl="1" indent="-228600" algn="l" defTabSz="933450">
+          <a:pPr marL="228600" lvl="1" indent="-228600" algn="l" defTabSz="889000">
             <a:lnSpc>
               <a:spcPct val="90000"/>
             </a:lnSpc>
@@ -10814,13 +10840,17 @@
             <a:buChar char="•"/>
           </a:pPr>
           <a:r>
-            <a:rPr lang="en-GB" sz="2100" kern="1200"/>
-            <a:t>Prior programming or scripting experience</a:t>
+            <a:rPr lang="en-GB" sz="2000" kern="1200" dirty="0"/>
+            <a:t>Programming/Scripting Experience: Python, Ruby, Bash and </a:t>
           </a:r>
-          <a:endParaRPr lang="en-US" sz="2100" kern="1200"/>
+          <a:r>
+            <a:rPr lang="en-GB" sz="2000" kern="1200" dirty="0" err="1"/>
+            <a:t>Powershell</a:t>
+          </a:r>
+          <a:endParaRPr lang="en-US" sz="2000" kern="1200" dirty="0"/>
         </a:p>
         <a:p>
-          <a:pPr marL="228600" lvl="1" indent="-228600" algn="l" defTabSz="933450">
+          <a:pPr marL="228600" lvl="1" indent="-228600" algn="l" defTabSz="889000">
             <a:lnSpc>
               <a:spcPct val="90000"/>
             </a:lnSpc>
@@ -10833,13 +10863,13 @@
             <a:buChar char="•"/>
           </a:pPr>
           <a:r>
-            <a:rPr lang="en-GB" sz="2100" kern="1200"/>
-            <a:t>Experience in Azure (or any other cloud vendor)</a:t>
+            <a:rPr lang="en-GB" sz="2000" kern="1200" dirty="0"/>
+            <a:t>Experience building solutions in Azure, AWS, GCP and On-Prem</a:t>
           </a:r>
-          <a:endParaRPr lang="en-US" sz="2100" kern="1200"/>
+          <a:endParaRPr lang="en-US" sz="2000" kern="1200" dirty="0"/>
         </a:p>
         <a:p>
-          <a:pPr marL="228600" lvl="1" indent="-228600" algn="l" defTabSz="933450">
+          <a:pPr marL="228600" lvl="1" indent="-228600" algn="l" defTabSz="889000">
             <a:lnSpc>
               <a:spcPct val="90000"/>
             </a:lnSpc>
@@ -10852,14 +10882,14 @@
             <a:buChar char="•"/>
           </a:pPr>
           <a:r>
-            <a:rPr lang="en-US" sz="2100" kern="1200"/>
-            <a:t>Prior experience in using Containers-as-Infrastructure</a:t>
+            <a:rPr lang="en-US" sz="2000" kern="1200" dirty="0"/>
+            <a:t>Prior experience in Kubernetes and Docker</a:t>
           </a:r>
         </a:p>
       </dsp:txBody>
       <dsp:txXfrm>
-        <a:off x="0" y="1348174"/>
-        <a:ext cx="11018837" cy="2447550"/>
+        <a:off x="0" y="1399068"/>
+        <a:ext cx="11018837" cy="2331000"/>
       </dsp:txXfrm>
     </dsp:sp>
     <dsp:sp modelId="{4D4B07DB-2B3B-48CC-9150-8437B717DBE4}">
@@ -10869,8 +10899,8 @@
       </dsp:nvSpPr>
       <dsp:spPr>
         <a:xfrm>
-          <a:off x="550941" y="1038213"/>
-          <a:ext cx="7713186" cy="619920"/>
+          <a:off x="550941" y="1103868"/>
+          <a:ext cx="7713186" cy="590400"/>
         </a:xfrm>
         <a:prstGeom prst="roundRect">
           <a:avLst/>
@@ -10916,7 +10946,7 @@
         </a:bodyPr>
         <a:lstStyle/>
         <a:p>
-          <a:pPr marL="0" lvl="0" indent="0" algn="l" defTabSz="933450">
+          <a:pPr marL="0" lvl="0" indent="0" algn="l" defTabSz="889000">
             <a:lnSpc>
               <a:spcPct val="90000"/>
             </a:lnSpc>
@@ -10929,14 +10959,14 @@
             <a:buNone/>
           </a:pPr>
           <a:r>
-            <a:rPr lang="en-US" sz="2100" kern="1200"/>
+            <a:rPr lang="en-US" sz="2000" kern="1200"/>
             <a:t>Your Background</a:t>
           </a:r>
         </a:p>
       </dsp:txBody>
       <dsp:txXfrm>
-        <a:off x="581203" y="1068475"/>
-        <a:ext cx="7652662" cy="559396"/>
+        <a:off x="579762" y="1132689"/>
+        <a:ext cx="7655544" cy="532758"/>
       </dsp:txXfrm>
     </dsp:sp>
     <dsp:sp modelId="{80661001-2FF7-4B78-933D-40E79F9140BF}">
@@ -10946,8 +10976,8 @@
       </dsp:nvSpPr>
       <dsp:spPr>
         <a:xfrm>
-          <a:off x="0" y="4219084"/>
-          <a:ext cx="11018837" cy="529200"/>
+          <a:off x="0" y="4133269"/>
+          <a:ext cx="11018837" cy="504000"/>
         </a:xfrm>
         <a:prstGeom prst="rect">
           <a:avLst/>
@@ -10994,8 +11024,8 @@
       </dsp:nvSpPr>
       <dsp:spPr>
         <a:xfrm>
-          <a:off x="550941" y="3909124"/>
-          <a:ext cx="7713186" cy="619920"/>
+          <a:off x="550941" y="3838069"/>
+          <a:ext cx="7713186" cy="590400"/>
         </a:xfrm>
         <a:prstGeom prst="roundRect">
           <a:avLst/>
@@ -11041,7 +11071,7 @@
         </a:bodyPr>
         <a:lstStyle/>
         <a:p>
-          <a:pPr marL="0" lvl="0" indent="0" algn="l" defTabSz="933450">
+          <a:pPr marL="0" lvl="0" indent="0" algn="l" defTabSz="889000">
             <a:lnSpc>
               <a:spcPct val="90000"/>
             </a:lnSpc>
@@ -11054,15 +11084,15 @@
             <a:buNone/>
           </a:pPr>
           <a:r>
-            <a:rPr lang="en-US" sz="2100" kern="1200" baseline="0"/>
+            <a:rPr lang="en-US" sz="2000" kern="1200" baseline="0"/>
             <a:t>Your objectives for this workshop</a:t>
           </a:r>
-          <a:endParaRPr lang="en-US" sz="2100" kern="1200"/>
+          <a:endParaRPr lang="en-US" sz="2000" kern="1200"/>
         </a:p>
       </dsp:txBody>
       <dsp:txXfrm>
-        <a:off x="581203" y="3939386"/>
-        <a:ext cx="7652662" cy="559396"/>
+        <a:off x="579762" y="3866890"/>
+        <a:ext cx="7655544" cy="532758"/>
       </dsp:txXfrm>
     </dsp:sp>
   </dsp:spTree>
@@ -23137,7 +23167,7 @@
               <a:rPr lang="en-US" smtClean="0">
                 <a:latin typeface="Segoe UI" pitchFamily="34" charset="0"/>
               </a:rPr>
-              <a:t>6/29/2023 12:09 PM</a:t>
+              <a:t>7/31/2023 8:55 AM</a:t>
             </a:fld>
             <a:endParaRPr lang="en-US" dirty="0">
               <a:latin typeface="Segoe UI" pitchFamily="34" charset="0"/>
@@ -23415,7 +23445,7 @@
           <a:p>
             <a:fld id="{386CE63F-9E7F-4C04-9D0D-FCA25A8E9E86}" type="datetime8">
               <a:rPr lang="en-US" smtClean="0"/>
-              <a:t>6/29/2023 12:09 PM</a:t>
+              <a:t>7/31/2023 8:55 AM</a:t>
             </a:fld>
             <a:endParaRPr lang="en-US" dirty="0"/>
           </a:p>
@@ -23828,7 +23858,7 @@
                   <a:prstClr val="black"/>
                 </a:solidFill>
               </a:rPr>
-              <a:t>6/29/2023 12:09 PM</a:t>
+              <a:t>7/31/2023 8:55 AM</a:t>
             </a:fld>
             <a:endParaRPr lang="en-US" dirty="0">
               <a:solidFill>
@@ -24265,7 +24295,7 @@
           <a:p>
             <a:fld id="{386CE63F-9E7F-4C04-9D0D-FCA25A8E9E86}" type="datetime8">
               <a:rPr lang="en-US" smtClean="0"/>
-              <a:t>6/29/2023 12:09 PM</a:t>
+              <a:t>7/31/2023 8:55 AM</a:t>
             </a:fld>
             <a:endParaRPr lang="en-US" dirty="0"/>
           </a:p>
@@ -24472,7 +24502,7 @@
           <a:p>
             <a:fld id="{386CE63F-9E7F-4C04-9D0D-FCA25A8E9E86}" type="datetime8">
               <a:rPr lang="en-US" smtClean="0"/>
-              <a:t>6/29/2023 12:09 PM</a:t>
+              <a:t>7/31/2023 8:55 AM</a:t>
             </a:fld>
             <a:endParaRPr lang="en-US" dirty="0"/>
           </a:p>
@@ -24653,7 +24683,7 @@
           <a:p>
             <a:fld id="{386CE63F-9E7F-4C04-9D0D-FCA25A8E9E86}" type="datetime8">
               <a:rPr lang="en-US" smtClean="0"/>
-              <a:t>6/29/2023 12:09 PM</a:t>
+              <a:t>7/31/2023 8:55 AM</a:t>
             </a:fld>
             <a:endParaRPr lang="en-US" dirty="0"/>
           </a:p>
@@ -24838,7 +24868,7 @@
           <a:p>
             <a:fld id="{386CE63F-9E7F-4C04-9D0D-FCA25A8E9E86}" type="datetime8">
               <a:rPr lang="en-US" smtClean="0"/>
-              <a:t>6/29/2023 12:09 PM</a:t>
+              <a:t>7/31/2023 8:55 AM</a:t>
             </a:fld>
             <a:endParaRPr lang="en-US" dirty="0"/>
           </a:p>
@@ -25018,7 +25048,7 @@
           <a:p>
             <a:fld id="{72E0C910-0166-48E0-B8EF-5071277A02A8}" type="datetime8">
               <a:rPr lang="en-US" smtClean="0"/>
-              <a:t>6/29/2023 12:09 PM</a:t>
+              <a:t>7/31/2023 8:55 AM</a:t>
             </a:fld>
             <a:endParaRPr lang="en-US" dirty="0"/>
           </a:p>
@@ -25198,7 +25228,7 @@
           <a:p>
             <a:fld id="{72E0C910-0166-48E0-B8EF-5071277A02A8}" type="datetime8">
               <a:rPr lang="en-US" smtClean="0"/>
-              <a:t>6/29/2023 12:09 PM</a:t>
+              <a:t>7/31/2023 8:55 AM</a:t>
             </a:fld>
             <a:endParaRPr lang="en-US" dirty="0"/>
           </a:p>
@@ -25363,7 +25393,7 @@
           <a:p>
             <a:fld id="{9427A7F7-BB1E-479D-AFAA-B52F4D0C99F2}" type="datetime8">
               <a:rPr lang="en-US" smtClean="0"/>
-              <a:t>6/29/2023 12:09 PM</a:t>
+              <a:t>7/31/2023 8:55 AM</a:t>
             </a:fld>
             <a:endParaRPr lang="en-US" dirty="0"/>
           </a:p>
@@ -36457,7 +36487,10 @@
           <a:bodyPr/>
           <a:lstStyle/>
           <a:p>
-            <a:endParaRPr lang="en-GB" dirty="0"/>
+            <a:r>
+              <a:rPr lang="en-GB" dirty="0"/>
+              <a:t>Ryan Russell-Yates</a:t>
+            </a:r>
           </a:p>
         </p:txBody>
       </p:sp>
@@ -37446,7 +37479,7 @@
             <p:ph sz="quarter" idx="10"/>
             <p:extLst>
               <p:ext uri="{D42A27DB-BD31-4B8C-83A1-F6EECF244321}">
-                <p14:modId xmlns:p14="http://schemas.microsoft.com/office/powerpoint/2010/main" val="1085319145"/>
+                <p14:modId xmlns:p14="http://schemas.microsoft.com/office/powerpoint/2010/main" val="1618294143"/>
               </p:ext>
             </p:extLst>
           </p:nvPr>
@@ -39591,30 +39624,6 @@
 </file>
 
 <file path=customXml/item1.xml><?xml version="1.0" encoding="utf-8"?>
-<?mso-contentType ?>
-<FormTemplates xmlns="http://schemas.microsoft.com/sharepoint/v3/contenttype/forms">
-  <Display>DocumentLibraryForm</Display>
-  <Edit>DocumentLibraryForm</Edit>
-  <New>DocumentLibraryForm</New>
-</FormTemplates>
-</file>
-
-<file path=customXml/item2.xml><?xml version="1.0" encoding="utf-8"?>
-<p:properties xmlns:p="http://schemas.microsoft.com/office/2006/metadata/properties" xmlns:pc="http://schemas.microsoft.com/office/infopath/2007/PartnerControls" xmlns:xsi="http://www.w3.org/2001/XMLSchema-instance">
-  <documentManagement>
-    <SharedWithUsers xmlns="53207a91-4873-4278-88cd-3a5c1985bff7">
-      <UserInfo>
-        <DisplayName/>
-        <AccountId xsi:nil="true"/>
-        <AccountType/>
-      </UserInfo>
-    </SharedWithUsers>
-    <SharedWithDetails xmlns="53207a91-4873-4278-88cd-3a5c1985bff7" xsi:nil="true"/>
-  </documentManagement>
-</p:properties>
-</file>
-
-<file path=customXml/item3.xml><?xml version="1.0" encoding="utf-8"?>
 <ct:contentTypeSchema xmlns:ct="http://schemas.microsoft.com/office/2006/metadata/contentType" xmlns:ma="http://schemas.microsoft.com/office/2006/metadata/properties/metaAttributes" ct:_="" ma:_="" ma:contentTypeName="Document" ma:contentTypeID="0x010100581AC3C96BC25B49BAADFDD2709736A2" ma:contentTypeVersion="13" ma:contentTypeDescription="Create a new document." ma:contentTypeScope="" ma:versionID="46d05e5ad3e10e23d0d91d2c812a342c">
   <xsd:schema xmlns:xsd="http://www.w3.org/2001/XMLSchema" xmlns:xs="http://www.w3.org/2001/XMLSchema" xmlns:p="http://schemas.microsoft.com/office/2006/metadata/properties" xmlns:ns3="61d4b2b7-c11c-4679-a498-c69870ddf3ad" xmlns:ns4="53207a91-4873-4278-88cd-3a5c1985bff7" targetNamespace="http://schemas.microsoft.com/office/2006/metadata/properties" ma:root="true" ma:fieldsID="23414a13395756fa7b20173620af81aa" ns3:_="" ns4:_="">
     <xsd:import namespace="61d4b2b7-c11c-4679-a498-c69870ddf3ad"/>
@@ -39837,25 +39846,31 @@
 </ct:contentTypeSchema>
 </file>
 
-<file path=customXml/itemProps1.xml><?xml version="1.0" encoding="utf-8"?>
-<ds:datastoreItem xmlns:ds="http://schemas.openxmlformats.org/officeDocument/2006/customXml" ds:itemID="{758FDAC0-319D-4A54-8D8E-1D42CB1F8004}">
-  <ds:schemaRefs>
-    <ds:schemaRef ds:uri="http://schemas.microsoft.com/sharepoint/v3/contenttype/forms"/>
-  </ds:schemaRefs>
-</ds:datastoreItem>
+<file path=customXml/item2.xml><?xml version="1.0" encoding="utf-8"?>
+<p:properties xmlns:p="http://schemas.microsoft.com/office/2006/metadata/properties" xmlns:pc="http://schemas.microsoft.com/office/infopath/2007/PartnerControls" xmlns:xsi="http://www.w3.org/2001/XMLSchema-instance">
+  <documentManagement>
+    <SharedWithUsers xmlns="53207a91-4873-4278-88cd-3a5c1985bff7">
+      <UserInfo>
+        <DisplayName/>
+        <AccountId xsi:nil="true"/>
+        <AccountType/>
+      </UserInfo>
+    </SharedWithUsers>
+    <SharedWithDetails xmlns="53207a91-4873-4278-88cd-3a5c1985bff7" xsi:nil="true"/>
+  </documentManagement>
+</p:properties>
 </file>
 
-<file path=customXml/itemProps2.xml><?xml version="1.0" encoding="utf-8"?>
-<ds:datastoreItem xmlns:ds="http://schemas.openxmlformats.org/officeDocument/2006/customXml" ds:itemID="{F990F116-B58F-4255-B05B-DA3808E0E5C6}">
-  <ds:schemaRefs>
-    <ds:schemaRef ds:uri="http://schemas.microsoft.com/office/2006/metadata/properties"/>
-    <ds:schemaRef ds:uri="http://schemas.microsoft.com/office/infopath/2007/PartnerControls"/>
-    <ds:schemaRef ds:uri="53207a91-4873-4278-88cd-3a5c1985bff7"/>
-  </ds:schemaRefs>
-</ds:datastoreItem>
+<file path=customXml/item3.xml><?xml version="1.0" encoding="utf-8"?>
+<?mso-contentType ?>
+<FormTemplates xmlns="http://schemas.microsoft.com/sharepoint/v3/contenttype/forms">
+  <Display>DocumentLibraryForm</Display>
+  <Edit>DocumentLibraryForm</Edit>
+  <New>DocumentLibraryForm</New>
+</FormTemplates>
 </file>
 
-<file path=customXml/itemProps3.xml><?xml version="1.0" encoding="utf-8"?>
+<file path=customXml/itemProps1.xml><?xml version="1.0" encoding="utf-8"?>
 <ds:datastoreItem xmlns:ds="http://schemas.openxmlformats.org/officeDocument/2006/customXml" ds:itemID="{C1BDA8C5-7B3C-4D87-A465-0404BD0EA35D}">
   <ds:schemaRefs>
     <ds:schemaRef ds:uri="http://schemas.microsoft.com/office/2006/metadata/contentType"/>
@@ -39874,6 +39889,24 @@
 </ds:datastoreItem>
 </file>
 
+<file path=customXml/itemProps2.xml><?xml version="1.0" encoding="utf-8"?>
+<ds:datastoreItem xmlns:ds="http://schemas.openxmlformats.org/officeDocument/2006/customXml" ds:itemID="{F990F116-B58F-4255-B05B-DA3808E0E5C6}">
+  <ds:schemaRefs>
+    <ds:schemaRef ds:uri="http://schemas.microsoft.com/office/2006/metadata/properties"/>
+    <ds:schemaRef ds:uri="http://schemas.microsoft.com/office/infopath/2007/PartnerControls"/>
+    <ds:schemaRef ds:uri="53207a91-4873-4278-88cd-3a5c1985bff7"/>
+  </ds:schemaRefs>
+</ds:datastoreItem>
+</file>
+
+<file path=customXml/itemProps3.xml><?xml version="1.0" encoding="utf-8"?>
+<ds:datastoreItem xmlns:ds="http://schemas.openxmlformats.org/officeDocument/2006/customXml" ds:itemID="{758FDAC0-319D-4A54-8D8E-1D42CB1F8004}">
+  <ds:schemaRefs>
+    <ds:schemaRef ds:uri="http://schemas.microsoft.com/sharepoint/v3/contenttype/forms"/>
+  </ds:schemaRefs>
+</ds:datastoreItem>
+</file>
+
 <file path=docMetadata/LabelInfo.xml><?xml version="1.0" encoding="utf-8"?>
 <clbl:labelList xmlns:clbl="http://schemas.microsoft.com/office/2020/mipLabelMetadata">
   <clbl:label id="{f42aa342-8706-4288-bd11-ebb85995028c}" enabled="1" method="Standard" siteId="{72f988bf-86f1-41af-91ab-2d7cd011db47}" removed="0"/>

</xml_diff>